<commit_message>
Oops! get newer version on github
</commit_message>
<xml_diff>
--- a/LargeScaleJavascriptAppsWithTypescriptKnockoutCrossroadsJs.pptx
+++ b/LargeScaleJavascriptAppsWithTypescriptKnockoutCrossroadsJs.pptx
@@ -2,8 +2,11 @@
 <file path=ppt/presentation.xml><?xml version="1.0" encoding="utf-8"?>
 <p:presentation xmlns:a="http://schemas.openxmlformats.org/drawingml/2006/main" xmlns:r="http://schemas.openxmlformats.org/officeDocument/2006/relationships" xmlns:p="http://schemas.openxmlformats.org/presentationml/2006/main" saveSubsetFonts="1">
   <p:sldMasterIdLst>
-    <p:sldMasterId id="2147483648" r:id="rId1"/>
+    <p:sldMasterId id="2147483660" r:id="rId1"/>
   </p:sldMasterIdLst>
+  <p:notesMasterIdLst>
+    <p:notesMasterId r:id="rId12"/>
+  </p:notesMasterIdLst>
   <p:sldIdLst>
     <p:sldId id="256" r:id="rId2"/>
     <p:sldId id="257" r:id="rId3"/>
@@ -13,9 +16,8 @@
     <p:sldId id="260" r:id="rId7"/>
     <p:sldId id="261" r:id="rId8"/>
     <p:sldId id="262" r:id="rId9"/>
-    <p:sldId id="264" r:id="rId10"/>
-    <p:sldId id="265" r:id="rId11"/>
-    <p:sldId id="266" r:id="rId12"/>
+    <p:sldId id="266" r:id="rId10"/>
+    <p:sldId id="267" r:id="rId11"/>
   </p:sldIdLst>
   <p:sldSz cx="12192000" cy="6858000"/>
   <p:notesSz cx="6858000" cy="9144000"/>
@@ -23,7 +25,7 @@
     <a:defPPr>
       <a:defRPr lang="en-US"/>
     </a:defPPr>
-    <a:lvl1pPr marL="0" algn="l" defTabSz="914400" rtl="0" eaLnBrk="1" latinLnBrk="0" hangingPunct="1">
+    <a:lvl1pPr marL="0" algn="l" defTabSz="457200" rtl="0" eaLnBrk="1" latinLnBrk="0" hangingPunct="1">
       <a:defRPr sz="1800" kern="1200">
         <a:solidFill>
           <a:schemeClr val="tx1"/>
@@ -33,7 +35,7 @@
         <a:cs typeface="+mn-cs"/>
       </a:defRPr>
     </a:lvl1pPr>
-    <a:lvl2pPr marL="457200" algn="l" defTabSz="914400" rtl="0" eaLnBrk="1" latinLnBrk="0" hangingPunct="1">
+    <a:lvl2pPr marL="457200" algn="l" defTabSz="457200" rtl="0" eaLnBrk="1" latinLnBrk="0" hangingPunct="1">
       <a:defRPr sz="1800" kern="1200">
         <a:solidFill>
           <a:schemeClr val="tx1"/>
@@ -43,7 +45,7 @@
         <a:cs typeface="+mn-cs"/>
       </a:defRPr>
     </a:lvl2pPr>
-    <a:lvl3pPr marL="914400" algn="l" defTabSz="914400" rtl="0" eaLnBrk="1" latinLnBrk="0" hangingPunct="1">
+    <a:lvl3pPr marL="914400" algn="l" defTabSz="457200" rtl="0" eaLnBrk="1" latinLnBrk="0" hangingPunct="1">
       <a:defRPr sz="1800" kern="1200">
         <a:solidFill>
           <a:schemeClr val="tx1"/>
@@ -53,7 +55,7 @@
         <a:cs typeface="+mn-cs"/>
       </a:defRPr>
     </a:lvl3pPr>
-    <a:lvl4pPr marL="1371600" algn="l" defTabSz="914400" rtl="0" eaLnBrk="1" latinLnBrk="0" hangingPunct="1">
+    <a:lvl4pPr marL="1371600" algn="l" defTabSz="457200" rtl="0" eaLnBrk="1" latinLnBrk="0" hangingPunct="1">
       <a:defRPr sz="1800" kern="1200">
         <a:solidFill>
           <a:schemeClr val="tx1"/>
@@ -63,7 +65,7 @@
         <a:cs typeface="+mn-cs"/>
       </a:defRPr>
     </a:lvl4pPr>
-    <a:lvl5pPr marL="1828800" algn="l" defTabSz="914400" rtl="0" eaLnBrk="1" latinLnBrk="0" hangingPunct="1">
+    <a:lvl5pPr marL="1828800" algn="l" defTabSz="457200" rtl="0" eaLnBrk="1" latinLnBrk="0" hangingPunct="1">
       <a:defRPr sz="1800" kern="1200">
         <a:solidFill>
           <a:schemeClr val="tx1"/>
@@ -73,7 +75,7 @@
         <a:cs typeface="+mn-cs"/>
       </a:defRPr>
     </a:lvl5pPr>
-    <a:lvl6pPr marL="2286000" algn="l" defTabSz="914400" rtl="0" eaLnBrk="1" latinLnBrk="0" hangingPunct="1">
+    <a:lvl6pPr marL="2286000" algn="l" defTabSz="457200" rtl="0" eaLnBrk="1" latinLnBrk="0" hangingPunct="1">
       <a:defRPr sz="1800" kern="1200">
         <a:solidFill>
           <a:schemeClr val="tx1"/>
@@ -83,7 +85,7 @@
         <a:cs typeface="+mn-cs"/>
       </a:defRPr>
     </a:lvl6pPr>
-    <a:lvl7pPr marL="2743200" algn="l" defTabSz="914400" rtl="0" eaLnBrk="1" latinLnBrk="0" hangingPunct="1">
+    <a:lvl7pPr marL="2743200" algn="l" defTabSz="457200" rtl="0" eaLnBrk="1" latinLnBrk="0" hangingPunct="1">
       <a:defRPr sz="1800" kern="1200">
         <a:solidFill>
           <a:schemeClr val="tx1"/>
@@ -93,7 +95,7 @@
         <a:cs typeface="+mn-cs"/>
       </a:defRPr>
     </a:lvl7pPr>
-    <a:lvl8pPr marL="3200400" algn="l" defTabSz="914400" rtl="0" eaLnBrk="1" latinLnBrk="0" hangingPunct="1">
+    <a:lvl8pPr marL="3200400" algn="l" defTabSz="457200" rtl="0" eaLnBrk="1" latinLnBrk="0" hangingPunct="1">
       <a:defRPr sz="1800" kern="1200">
         <a:solidFill>
           <a:schemeClr val="tx1"/>
@@ -103,7 +105,7 @@
         <a:cs typeface="+mn-cs"/>
       </a:defRPr>
     </a:lvl8pPr>
-    <a:lvl9pPr marL="3657600" algn="l" defTabSz="914400" rtl="0" eaLnBrk="1" latinLnBrk="0" hangingPunct="1">
+    <a:lvl9pPr marL="3657600" algn="l" defTabSz="457200" rtl="0" eaLnBrk="1" latinLnBrk="0" hangingPunct="1">
       <a:defRPr sz="1800" kern="1200">
         <a:solidFill>
           <a:schemeClr val="tx1"/>
@@ -114,7 +116,1587 @@
       </a:defRPr>
     </a:lvl9pPr>
   </p:defaultTextStyle>
+  <p:extLst>
+    <p:ext uri="{EFAFB233-063F-42B5-8137-9DF3F51BA10A}">
+      <p15:sldGuideLst xmlns:p15="http://schemas.microsoft.com/office/powerpoint/2012/main"/>
+    </p:ext>
+  </p:extLst>
 </p:presentation>
+</file>
+
+<file path=ppt/revisionInfo.xml><?xml version="1.0" encoding="utf-8"?>
+<p1510:revInfo xmlns:a="http://schemas.openxmlformats.org/drawingml/2006/main" xmlns:r="http://schemas.openxmlformats.org/officeDocument/2006/relationships" xmlns:p1510="http://schemas.microsoft.com/office/powerpoint/2015/10/main"/>
+</file>
+
+<file path=ppt/notesMasters/notesMaster1.xml><?xml version="1.0" encoding="utf-8"?>
+<p:notesMaster xmlns:a="http://schemas.openxmlformats.org/drawingml/2006/main" xmlns:r="http://schemas.openxmlformats.org/officeDocument/2006/relationships" xmlns:p="http://schemas.openxmlformats.org/presentationml/2006/main">
+  <p:cSld>
+    <p:bg>
+      <p:bgRef idx="1001">
+        <a:schemeClr val="bg1"/>
+      </p:bgRef>
+    </p:bg>
+    <p:spTree>
+      <p:nvGrpSpPr>
+        <p:cNvPr id="1" name=""/>
+        <p:cNvGrpSpPr/>
+        <p:nvPr/>
+      </p:nvGrpSpPr>
+      <p:grpSpPr>
+        <a:xfrm>
+          <a:off x="0" y="0"/>
+          <a:ext cx="0" cy="0"/>
+          <a:chOff x="0" y="0"/>
+          <a:chExt cx="0" cy="0"/>
+        </a:xfrm>
+      </p:grpSpPr>
+      <p:sp>
+        <p:nvSpPr>
+          <p:cNvPr id="2" name="Header Placeholder 1"/>
+          <p:cNvSpPr>
+            <a:spLocks noGrp="1"/>
+          </p:cNvSpPr>
+          <p:nvPr>
+            <p:ph type="hdr" sz="quarter"/>
+          </p:nvPr>
+        </p:nvSpPr>
+        <p:spPr>
+          <a:xfrm>
+            <a:off x="0" y="0"/>
+            <a:ext cx="2971800" cy="458788"/>
+          </a:xfrm>
+          <a:prstGeom prst="rect">
+            <a:avLst/>
+          </a:prstGeom>
+        </p:spPr>
+        <p:txBody>
+          <a:bodyPr vert="horz" lIns="91440" tIns="45720" rIns="91440" bIns="45720" rtlCol="0"/>
+          <a:lstStyle>
+            <a:lvl1pPr algn="l">
+              <a:defRPr sz="1200"/>
+            </a:lvl1pPr>
+          </a:lstStyle>
+          <a:p>
+            <a:endParaRPr lang="en-AU"/>
+          </a:p>
+        </p:txBody>
+      </p:sp>
+      <p:sp>
+        <p:nvSpPr>
+          <p:cNvPr id="3" name="Date Placeholder 2"/>
+          <p:cNvSpPr>
+            <a:spLocks noGrp="1"/>
+          </p:cNvSpPr>
+          <p:nvPr>
+            <p:ph type="dt" idx="1"/>
+          </p:nvPr>
+        </p:nvSpPr>
+        <p:spPr>
+          <a:xfrm>
+            <a:off x="3884613" y="0"/>
+            <a:ext cx="2971800" cy="458788"/>
+          </a:xfrm>
+          <a:prstGeom prst="rect">
+            <a:avLst/>
+          </a:prstGeom>
+        </p:spPr>
+        <p:txBody>
+          <a:bodyPr vert="horz" lIns="91440" tIns="45720" rIns="91440" bIns="45720" rtlCol="0"/>
+          <a:lstStyle>
+            <a:lvl1pPr algn="r">
+              <a:defRPr sz="1200"/>
+            </a:lvl1pPr>
+          </a:lstStyle>
+          <a:p>
+            <a:fld id="{4271FAD5-1123-4BBC-9784-32CE6849E41B}" type="datetimeFigureOut">
+              <a:rPr lang="en-AU" smtClean="0"/>
+              <a:t>25/09/2017</a:t>
+            </a:fld>
+            <a:endParaRPr lang="en-AU"/>
+          </a:p>
+        </p:txBody>
+      </p:sp>
+      <p:sp>
+        <p:nvSpPr>
+          <p:cNvPr id="4" name="Slide Image Placeholder 3"/>
+          <p:cNvSpPr>
+            <a:spLocks noGrp="1" noRot="1" noChangeAspect="1"/>
+          </p:cNvSpPr>
+          <p:nvPr>
+            <p:ph type="sldImg" idx="2"/>
+          </p:nvPr>
+        </p:nvSpPr>
+        <p:spPr>
+          <a:xfrm>
+            <a:off x="685800" y="1143000"/>
+            <a:ext cx="5486400" cy="3086100"/>
+          </a:xfrm>
+          <a:prstGeom prst="rect">
+            <a:avLst/>
+          </a:prstGeom>
+          <a:noFill/>
+          <a:ln w="12700">
+            <a:solidFill>
+              <a:prstClr val="black"/>
+            </a:solidFill>
+          </a:ln>
+        </p:spPr>
+        <p:txBody>
+          <a:bodyPr vert="horz" lIns="91440" tIns="45720" rIns="91440" bIns="45720" rtlCol="0" anchor="ctr"/>
+          <a:lstStyle/>
+          <a:p>
+            <a:endParaRPr lang="en-AU"/>
+          </a:p>
+        </p:txBody>
+      </p:sp>
+      <p:sp>
+        <p:nvSpPr>
+          <p:cNvPr id="5" name="Notes Placeholder 4"/>
+          <p:cNvSpPr>
+            <a:spLocks noGrp="1"/>
+          </p:cNvSpPr>
+          <p:nvPr>
+            <p:ph type="body" sz="quarter" idx="3"/>
+          </p:nvPr>
+        </p:nvSpPr>
+        <p:spPr>
+          <a:xfrm>
+            <a:off x="685800" y="4400550"/>
+            <a:ext cx="5486400" cy="3600450"/>
+          </a:xfrm>
+          <a:prstGeom prst="rect">
+            <a:avLst/>
+          </a:prstGeom>
+        </p:spPr>
+        <p:txBody>
+          <a:bodyPr vert="horz" lIns="91440" tIns="45720" rIns="91440" bIns="45720" rtlCol="0"/>
+          <a:lstStyle/>
+          <a:p>
+            <a:pPr lvl="0"/>
+            <a:r>
+              <a:rPr lang="en-US"/>
+              <a:t>Edit Master text styles</a:t>
+            </a:r>
+          </a:p>
+          <a:p>
+            <a:pPr lvl="1"/>
+            <a:r>
+              <a:rPr lang="en-US"/>
+              <a:t>Second level</a:t>
+            </a:r>
+          </a:p>
+          <a:p>
+            <a:pPr lvl="2"/>
+            <a:r>
+              <a:rPr lang="en-US"/>
+              <a:t>Third level</a:t>
+            </a:r>
+          </a:p>
+          <a:p>
+            <a:pPr lvl="3"/>
+            <a:r>
+              <a:rPr lang="en-US"/>
+              <a:t>Fourth level</a:t>
+            </a:r>
+          </a:p>
+          <a:p>
+            <a:pPr lvl="4"/>
+            <a:r>
+              <a:rPr lang="en-US"/>
+              <a:t>Fifth level</a:t>
+            </a:r>
+            <a:endParaRPr lang="en-AU"/>
+          </a:p>
+        </p:txBody>
+      </p:sp>
+      <p:sp>
+        <p:nvSpPr>
+          <p:cNvPr id="6" name="Footer Placeholder 5"/>
+          <p:cNvSpPr>
+            <a:spLocks noGrp="1"/>
+          </p:cNvSpPr>
+          <p:nvPr>
+            <p:ph type="ftr" sz="quarter" idx="4"/>
+          </p:nvPr>
+        </p:nvSpPr>
+        <p:spPr>
+          <a:xfrm>
+            <a:off x="0" y="8685213"/>
+            <a:ext cx="2971800" cy="458787"/>
+          </a:xfrm>
+          <a:prstGeom prst="rect">
+            <a:avLst/>
+          </a:prstGeom>
+        </p:spPr>
+        <p:txBody>
+          <a:bodyPr vert="horz" lIns="91440" tIns="45720" rIns="91440" bIns="45720" rtlCol="0" anchor="b"/>
+          <a:lstStyle>
+            <a:lvl1pPr algn="l">
+              <a:defRPr sz="1200"/>
+            </a:lvl1pPr>
+          </a:lstStyle>
+          <a:p>
+            <a:endParaRPr lang="en-AU"/>
+          </a:p>
+        </p:txBody>
+      </p:sp>
+      <p:sp>
+        <p:nvSpPr>
+          <p:cNvPr id="7" name="Slide Number Placeholder 6"/>
+          <p:cNvSpPr>
+            <a:spLocks noGrp="1"/>
+          </p:cNvSpPr>
+          <p:nvPr>
+            <p:ph type="sldNum" sz="quarter" idx="5"/>
+          </p:nvPr>
+        </p:nvSpPr>
+        <p:spPr>
+          <a:xfrm>
+            <a:off x="3884613" y="8685213"/>
+            <a:ext cx="2971800" cy="458787"/>
+          </a:xfrm>
+          <a:prstGeom prst="rect">
+            <a:avLst/>
+          </a:prstGeom>
+        </p:spPr>
+        <p:txBody>
+          <a:bodyPr vert="horz" lIns="91440" tIns="45720" rIns="91440" bIns="45720" rtlCol="0" anchor="b"/>
+          <a:lstStyle>
+            <a:lvl1pPr algn="r">
+              <a:defRPr sz="1200"/>
+            </a:lvl1pPr>
+          </a:lstStyle>
+          <a:p>
+            <a:fld id="{0070A078-10BE-47CC-A058-89BE94A69865}" type="slidenum">
+              <a:rPr lang="en-AU" smtClean="0"/>
+              <a:t>‹#›</a:t>
+            </a:fld>
+            <a:endParaRPr lang="en-AU"/>
+          </a:p>
+        </p:txBody>
+      </p:sp>
+    </p:spTree>
+    <p:extLst>
+      <p:ext uri="{BB962C8B-B14F-4D97-AF65-F5344CB8AC3E}">
+        <p14:creationId xmlns:p14="http://schemas.microsoft.com/office/powerpoint/2010/main" val="1782835822"/>
+      </p:ext>
+    </p:extLst>
+  </p:cSld>
+  <p:clrMap bg1="lt1" tx1="dk1" bg2="lt2" tx2="dk2" accent1="accent1" accent2="accent2" accent3="accent3" accent4="accent4" accent5="accent5" accent6="accent6" hlink="hlink" folHlink="folHlink"/>
+  <p:notesStyle>
+    <a:lvl1pPr marL="0" algn="l" defTabSz="914400" rtl="0" eaLnBrk="1" latinLnBrk="0" hangingPunct="1">
+      <a:defRPr sz="1200" kern="1200">
+        <a:solidFill>
+          <a:schemeClr val="tx1"/>
+        </a:solidFill>
+        <a:latin typeface="+mn-lt"/>
+        <a:ea typeface="+mn-ea"/>
+        <a:cs typeface="+mn-cs"/>
+      </a:defRPr>
+    </a:lvl1pPr>
+    <a:lvl2pPr marL="457200" algn="l" defTabSz="914400" rtl="0" eaLnBrk="1" latinLnBrk="0" hangingPunct="1">
+      <a:defRPr sz="1200" kern="1200">
+        <a:solidFill>
+          <a:schemeClr val="tx1"/>
+        </a:solidFill>
+        <a:latin typeface="+mn-lt"/>
+        <a:ea typeface="+mn-ea"/>
+        <a:cs typeface="+mn-cs"/>
+      </a:defRPr>
+    </a:lvl2pPr>
+    <a:lvl3pPr marL="914400" algn="l" defTabSz="914400" rtl="0" eaLnBrk="1" latinLnBrk="0" hangingPunct="1">
+      <a:defRPr sz="1200" kern="1200">
+        <a:solidFill>
+          <a:schemeClr val="tx1"/>
+        </a:solidFill>
+        <a:latin typeface="+mn-lt"/>
+        <a:ea typeface="+mn-ea"/>
+        <a:cs typeface="+mn-cs"/>
+      </a:defRPr>
+    </a:lvl3pPr>
+    <a:lvl4pPr marL="1371600" algn="l" defTabSz="914400" rtl="0" eaLnBrk="1" latinLnBrk="0" hangingPunct="1">
+      <a:defRPr sz="1200" kern="1200">
+        <a:solidFill>
+          <a:schemeClr val="tx1"/>
+        </a:solidFill>
+        <a:latin typeface="+mn-lt"/>
+        <a:ea typeface="+mn-ea"/>
+        <a:cs typeface="+mn-cs"/>
+      </a:defRPr>
+    </a:lvl4pPr>
+    <a:lvl5pPr marL="1828800" algn="l" defTabSz="914400" rtl="0" eaLnBrk="1" latinLnBrk="0" hangingPunct="1">
+      <a:defRPr sz="1200" kern="1200">
+        <a:solidFill>
+          <a:schemeClr val="tx1"/>
+        </a:solidFill>
+        <a:latin typeface="+mn-lt"/>
+        <a:ea typeface="+mn-ea"/>
+        <a:cs typeface="+mn-cs"/>
+      </a:defRPr>
+    </a:lvl5pPr>
+    <a:lvl6pPr marL="2286000" algn="l" defTabSz="914400" rtl="0" eaLnBrk="1" latinLnBrk="0" hangingPunct="1">
+      <a:defRPr sz="1200" kern="1200">
+        <a:solidFill>
+          <a:schemeClr val="tx1"/>
+        </a:solidFill>
+        <a:latin typeface="+mn-lt"/>
+        <a:ea typeface="+mn-ea"/>
+        <a:cs typeface="+mn-cs"/>
+      </a:defRPr>
+    </a:lvl6pPr>
+    <a:lvl7pPr marL="2743200" algn="l" defTabSz="914400" rtl="0" eaLnBrk="1" latinLnBrk="0" hangingPunct="1">
+      <a:defRPr sz="1200" kern="1200">
+        <a:solidFill>
+          <a:schemeClr val="tx1"/>
+        </a:solidFill>
+        <a:latin typeface="+mn-lt"/>
+        <a:ea typeface="+mn-ea"/>
+        <a:cs typeface="+mn-cs"/>
+      </a:defRPr>
+    </a:lvl7pPr>
+    <a:lvl8pPr marL="3200400" algn="l" defTabSz="914400" rtl="0" eaLnBrk="1" latinLnBrk="0" hangingPunct="1">
+      <a:defRPr sz="1200" kern="1200">
+        <a:solidFill>
+          <a:schemeClr val="tx1"/>
+        </a:solidFill>
+        <a:latin typeface="+mn-lt"/>
+        <a:ea typeface="+mn-ea"/>
+        <a:cs typeface="+mn-cs"/>
+      </a:defRPr>
+    </a:lvl8pPr>
+    <a:lvl9pPr marL="3657600" algn="l" defTabSz="914400" rtl="0" eaLnBrk="1" latinLnBrk="0" hangingPunct="1">
+      <a:defRPr sz="1200" kern="1200">
+        <a:solidFill>
+          <a:schemeClr val="tx1"/>
+        </a:solidFill>
+        <a:latin typeface="+mn-lt"/>
+        <a:ea typeface="+mn-ea"/>
+        <a:cs typeface="+mn-cs"/>
+      </a:defRPr>
+    </a:lvl9pPr>
+  </p:notesStyle>
+</p:notesMaster>
+</file>
+
+<file path=ppt/notesSlides/notesSlide1.xml><?xml version="1.0" encoding="utf-8"?>
+<p:notes xmlns:a="http://schemas.openxmlformats.org/drawingml/2006/main" xmlns:r="http://schemas.openxmlformats.org/officeDocument/2006/relationships" xmlns:p="http://schemas.openxmlformats.org/presentationml/2006/main">
+  <p:cSld>
+    <p:spTree>
+      <p:nvGrpSpPr>
+        <p:cNvPr id="1" name=""/>
+        <p:cNvGrpSpPr/>
+        <p:nvPr/>
+      </p:nvGrpSpPr>
+      <p:grpSpPr>
+        <a:xfrm>
+          <a:off x="0" y="0"/>
+          <a:ext cx="0" cy="0"/>
+          <a:chOff x="0" y="0"/>
+          <a:chExt cx="0" cy="0"/>
+        </a:xfrm>
+      </p:grpSpPr>
+      <p:sp>
+        <p:nvSpPr>
+          <p:cNvPr id="2" name="Slide Image Placeholder 1"/>
+          <p:cNvSpPr>
+            <a:spLocks noGrp="1" noRot="1" noChangeAspect="1"/>
+          </p:cNvSpPr>
+          <p:nvPr>
+            <p:ph type="sldImg"/>
+          </p:nvPr>
+        </p:nvSpPr>
+        <p:spPr/>
+      </p:sp>
+      <p:sp>
+        <p:nvSpPr>
+          <p:cNvPr id="3" name="Notes Placeholder 2"/>
+          <p:cNvSpPr>
+            <a:spLocks noGrp="1"/>
+          </p:cNvSpPr>
+          <p:nvPr>
+            <p:ph type="body" idx="1"/>
+          </p:nvPr>
+        </p:nvSpPr>
+        <p:spPr/>
+        <p:txBody>
+          <a:bodyPr/>
+          <a:lstStyle/>
+          <a:p>
+            <a:pPr marL="171450" indent="-171450">
+              <a:buFontTx/>
+              <a:buChar char="-"/>
+            </a:pPr>
+            <a:r>
+              <a:rPr lang="en-AU" dirty="0"/>
+              <a:t>Typescript – static type checking removes a whole class of errors. </a:t>
+            </a:r>
+          </a:p>
+          <a:p>
+            <a:pPr marL="171450" indent="-171450">
+              <a:buFontTx/>
+              <a:buChar char="-"/>
+            </a:pPr>
+            <a:r>
+              <a:rPr lang="en-AU" dirty="0"/>
+              <a:t>Components – MVVM components with Knockout</a:t>
+            </a:r>
+          </a:p>
+          <a:p>
+            <a:pPr marL="171450" indent="-171450">
+              <a:buFontTx/>
+              <a:buChar char="-"/>
+            </a:pPr>
+            <a:r>
+              <a:rPr lang="en-AU" dirty="0"/>
+              <a:t>Html-to-</a:t>
+            </a:r>
+            <a:r>
+              <a:rPr lang="en-AU" dirty="0" err="1"/>
+              <a:t>json</a:t>
+            </a:r>
+            <a:r>
+              <a:rPr lang="en-AU" dirty="0"/>
+              <a:t> – convert html to </a:t>
+            </a:r>
+            <a:r>
+              <a:rPr lang="en-AU" dirty="0" err="1"/>
+              <a:t>json</a:t>
+            </a:r>
+            <a:r>
+              <a:rPr lang="en-AU" dirty="0"/>
+              <a:t> so that we can bundle it as regular </a:t>
+            </a:r>
+            <a:r>
+              <a:rPr lang="en-AU" dirty="0" err="1"/>
+              <a:t>javascript</a:t>
+            </a:r>
+            <a:endParaRPr lang="en-AU" dirty="0"/>
+          </a:p>
+          <a:p>
+            <a:pPr marL="171450" indent="-171450">
+              <a:buFontTx/>
+              <a:buChar char="-"/>
+            </a:pPr>
+            <a:r>
+              <a:rPr lang="en-AU" dirty="0"/>
+              <a:t>Routing – routing separates navigation concern from application code</a:t>
+            </a:r>
+          </a:p>
+          <a:p>
+            <a:pPr marL="171450" indent="-171450">
+              <a:buFontTx/>
+              <a:buChar char="-"/>
+            </a:pPr>
+            <a:endParaRPr lang="en-AU" dirty="0"/>
+          </a:p>
+        </p:txBody>
+      </p:sp>
+      <p:sp>
+        <p:nvSpPr>
+          <p:cNvPr id="4" name="Slide Number Placeholder 3"/>
+          <p:cNvSpPr>
+            <a:spLocks noGrp="1"/>
+          </p:cNvSpPr>
+          <p:nvPr>
+            <p:ph type="sldNum" sz="quarter" idx="10"/>
+          </p:nvPr>
+        </p:nvSpPr>
+        <p:spPr/>
+        <p:txBody>
+          <a:bodyPr/>
+          <a:lstStyle/>
+          <a:p>
+            <a:fld id="{0070A078-10BE-47CC-A058-89BE94A69865}" type="slidenum">
+              <a:rPr lang="en-AU" smtClean="0"/>
+              <a:t>2</a:t>
+            </a:fld>
+            <a:endParaRPr lang="en-AU"/>
+          </a:p>
+        </p:txBody>
+      </p:sp>
+    </p:spTree>
+    <p:extLst>
+      <p:ext uri="{BB962C8B-B14F-4D97-AF65-F5344CB8AC3E}">
+        <p14:creationId xmlns:p14="http://schemas.microsoft.com/office/powerpoint/2010/main" val="3822460802"/>
+      </p:ext>
+    </p:extLst>
+  </p:cSld>
+  <p:clrMapOvr>
+    <a:masterClrMapping/>
+  </p:clrMapOvr>
+</p:notes>
+</file>
+
+<file path=ppt/notesSlides/notesSlide2.xml><?xml version="1.0" encoding="utf-8"?>
+<p:notes xmlns:a="http://schemas.openxmlformats.org/drawingml/2006/main" xmlns:r="http://schemas.openxmlformats.org/officeDocument/2006/relationships" xmlns:p="http://schemas.openxmlformats.org/presentationml/2006/main">
+  <p:cSld>
+    <p:spTree>
+      <p:nvGrpSpPr>
+        <p:cNvPr id="1" name=""/>
+        <p:cNvGrpSpPr/>
+        <p:nvPr/>
+      </p:nvGrpSpPr>
+      <p:grpSpPr>
+        <a:xfrm>
+          <a:off x="0" y="0"/>
+          <a:ext cx="0" cy="0"/>
+          <a:chOff x="0" y="0"/>
+          <a:chExt cx="0" cy="0"/>
+        </a:xfrm>
+      </p:grpSpPr>
+      <p:sp>
+        <p:nvSpPr>
+          <p:cNvPr id="2" name="Slide Image Placeholder 1"/>
+          <p:cNvSpPr>
+            <a:spLocks noGrp="1" noRot="1" noChangeAspect="1"/>
+          </p:cNvSpPr>
+          <p:nvPr>
+            <p:ph type="sldImg"/>
+          </p:nvPr>
+        </p:nvSpPr>
+        <p:spPr/>
+      </p:sp>
+      <p:sp>
+        <p:nvSpPr>
+          <p:cNvPr id="3" name="Notes Placeholder 2"/>
+          <p:cNvSpPr>
+            <a:spLocks noGrp="1"/>
+          </p:cNvSpPr>
+          <p:nvPr>
+            <p:ph type="body" idx="1"/>
+          </p:nvPr>
+        </p:nvSpPr>
+        <p:spPr/>
+        <p:txBody>
+          <a:bodyPr/>
+          <a:lstStyle/>
+          <a:p>
+            <a:r>
+              <a:rPr lang="en-AU" dirty="0"/>
+              <a:t>Multiple factors for success</a:t>
+            </a:r>
+          </a:p>
+          <a:p>
+            <a:pPr marL="171450" indent="-171450">
+              <a:buFontTx/>
+              <a:buChar char="-"/>
+            </a:pPr>
+            <a:r>
+              <a:rPr lang="en-AU" dirty="0"/>
+              <a:t>Typescript + </a:t>
+            </a:r>
+            <a:r>
+              <a:rPr lang="en-AU" dirty="0" err="1"/>
+              <a:t>VSCode</a:t>
+            </a:r>
+            <a:endParaRPr lang="en-AU" dirty="0"/>
+          </a:p>
+          <a:p>
+            <a:pPr marL="171450" indent="-171450">
+              <a:buFontTx/>
+              <a:buChar char="-"/>
+            </a:pPr>
+            <a:r>
+              <a:rPr lang="en-AU" dirty="0"/>
+              <a:t>able to reuse all knockout bindings</a:t>
+            </a:r>
+          </a:p>
+          <a:p>
+            <a:pPr marL="171450" indent="-171450">
+              <a:buFontTx/>
+              <a:buChar char="-"/>
+            </a:pPr>
+            <a:r>
+              <a:rPr lang="en-AU" dirty="0"/>
+              <a:t>Use familiar jasmine framework for testing</a:t>
+            </a:r>
+          </a:p>
+          <a:p>
+            <a:pPr marL="171450" indent="-171450">
+              <a:buFontTx/>
+              <a:buChar char="-"/>
+            </a:pPr>
+            <a:endParaRPr lang="en-AU" dirty="0"/>
+          </a:p>
+        </p:txBody>
+      </p:sp>
+      <p:sp>
+        <p:nvSpPr>
+          <p:cNvPr id="4" name="Slide Number Placeholder 3"/>
+          <p:cNvSpPr>
+            <a:spLocks noGrp="1"/>
+          </p:cNvSpPr>
+          <p:nvPr>
+            <p:ph type="sldNum" sz="quarter" idx="10"/>
+          </p:nvPr>
+        </p:nvSpPr>
+        <p:spPr/>
+        <p:txBody>
+          <a:bodyPr/>
+          <a:lstStyle/>
+          <a:p>
+            <a:fld id="{0070A078-10BE-47CC-A058-89BE94A69865}" type="slidenum">
+              <a:rPr lang="en-AU" smtClean="0"/>
+              <a:t>3</a:t>
+            </a:fld>
+            <a:endParaRPr lang="en-AU"/>
+          </a:p>
+        </p:txBody>
+      </p:sp>
+    </p:spTree>
+    <p:extLst>
+      <p:ext uri="{BB962C8B-B14F-4D97-AF65-F5344CB8AC3E}">
+        <p14:creationId xmlns:p14="http://schemas.microsoft.com/office/powerpoint/2010/main" val="3638119820"/>
+      </p:ext>
+    </p:extLst>
+  </p:cSld>
+  <p:clrMapOvr>
+    <a:masterClrMapping/>
+  </p:clrMapOvr>
+</p:notes>
+</file>
+
+<file path=ppt/notesSlides/notesSlide3.xml><?xml version="1.0" encoding="utf-8"?>
+<p:notes xmlns:a="http://schemas.openxmlformats.org/drawingml/2006/main" xmlns:r="http://schemas.openxmlformats.org/officeDocument/2006/relationships" xmlns:p="http://schemas.openxmlformats.org/presentationml/2006/main">
+  <p:cSld>
+    <p:spTree>
+      <p:nvGrpSpPr>
+        <p:cNvPr id="1" name=""/>
+        <p:cNvGrpSpPr/>
+        <p:nvPr/>
+      </p:nvGrpSpPr>
+      <p:grpSpPr>
+        <a:xfrm>
+          <a:off x="0" y="0"/>
+          <a:ext cx="0" cy="0"/>
+          <a:chOff x="0" y="0"/>
+          <a:chExt cx="0" cy="0"/>
+        </a:xfrm>
+      </p:grpSpPr>
+      <p:sp>
+        <p:nvSpPr>
+          <p:cNvPr id="2" name="Slide Image Placeholder 1"/>
+          <p:cNvSpPr>
+            <a:spLocks noGrp="1" noRot="1" noChangeAspect="1"/>
+          </p:cNvSpPr>
+          <p:nvPr>
+            <p:ph type="sldImg"/>
+          </p:nvPr>
+        </p:nvSpPr>
+        <p:spPr/>
+      </p:sp>
+      <p:sp>
+        <p:nvSpPr>
+          <p:cNvPr id="3" name="Notes Placeholder 2"/>
+          <p:cNvSpPr>
+            <a:spLocks noGrp="1"/>
+          </p:cNvSpPr>
+          <p:nvPr>
+            <p:ph type="body" idx="1"/>
+          </p:nvPr>
+        </p:nvSpPr>
+        <p:spPr/>
+        <p:txBody>
+          <a:bodyPr/>
+          <a:lstStyle/>
+          <a:p>
+            <a:pPr marL="171450" indent="-171450">
+              <a:buFontTx/>
+              <a:buChar char="-"/>
+            </a:pPr>
+            <a:r>
+              <a:rPr lang="en-AU" dirty="0"/>
+              <a:t>Global modules – entirely by convention</a:t>
+            </a:r>
+          </a:p>
+          <a:p>
+            <a:pPr marL="171450" indent="-171450">
+              <a:buFontTx/>
+              <a:buChar char="-"/>
+            </a:pPr>
+            <a:r>
+              <a:rPr lang="en-AU" dirty="0" err="1"/>
+              <a:t>Upto</a:t>
+            </a:r>
+            <a:r>
+              <a:rPr lang="en-AU" dirty="0"/>
+              <a:t> developers to make sure one SPA module doesn’t overwrite another</a:t>
+            </a:r>
+          </a:p>
+          <a:p>
+            <a:pPr marL="171450" indent="-171450">
+              <a:buFontTx/>
+              <a:buChar char="-"/>
+            </a:pPr>
+            <a:r>
+              <a:rPr lang="en-AU" dirty="0"/>
+              <a:t>Within a SPA, Typescript provides safety</a:t>
+            </a:r>
+          </a:p>
+        </p:txBody>
+      </p:sp>
+      <p:sp>
+        <p:nvSpPr>
+          <p:cNvPr id="4" name="Slide Number Placeholder 3"/>
+          <p:cNvSpPr>
+            <a:spLocks noGrp="1"/>
+          </p:cNvSpPr>
+          <p:nvPr>
+            <p:ph type="sldNum" sz="quarter" idx="10"/>
+          </p:nvPr>
+        </p:nvSpPr>
+        <p:spPr/>
+        <p:txBody>
+          <a:bodyPr/>
+          <a:lstStyle/>
+          <a:p>
+            <a:fld id="{0070A078-10BE-47CC-A058-89BE94A69865}" type="slidenum">
+              <a:rPr lang="en-AU" smtClean="0"/>
+              <a:t>4</a:t>
+            </a:fld>
+            <a:endParaRPr lang="en-AU"/>
+          </a:p>
+        </p:txBody>
+      </p:sp>
+    </p:spTree>
+    <p:extLst>
+      <p:ext uri="{BB962C8B-B14F-4D97-AF65-F5344CB8AC3E}">
+        <p14:creationId xmlns:p14="http://schemas.microsoft.com/office/powerpoint/2010/main" val="3539672955"/>
+      </p:ext>
+    </p:extLst>
+  </p:cSld>
+  <p:clrMapOvr>
+    <a:masterClrMapping/>
+  </p:clrMapOvr>
+</p:notes>
+</file>
+
+<file path=ppt/notesSlides/notesSlide4.xml><?xml version="1.0" encoding="utf-8"?>
+<p:notes xmlns:a="http://schemas.openxmlformats.org/drawingml/2006/main" xmlns:r="http://schemas.openxmlformats.org/officeDocument/2006/relationships" xmlns:p="http://schemas.openxmlformats.org/presentationml/2006/main">
+  <p:cSld>
+    <p:spTree>
+      <p:nvGrpSpPr>
+        <p:cNvPr id="1" name=""/>
+        <p:cNvGrpSpPr/>
+        <p:nvPr/>
+      </p:nvGrpSpPr>
+      <p:grpSpPr>
+        <a:xfrm>
+          <a:off x="0" y="0"/>
+          <a:ext cx="0" cy="0"/>
+          <a:chOff x="0" y="0"/>
+          <a:chExt cx="0" cy="0"/>
+        </a:xfrm>
+      </p:grpSpPr>
+      <p:sp>
+        <p:nvSpPr>
+          <p:cNvPr id="2" name="Slide Image Placeholder 1"/>
+          <p:cNvSpPr>
+            <a:spLocks noGrp="1" noRot="1" noChangeAspect="1"/>
+          </p:cNvSpPr>
+          <p:nvPr>
+            <p:ph type="sldImg"/>
+          </p:nvPr>
+        </p:nvSpPr>
+        <p:spPr/>
+      </p:sp>
+      <p:sp>
+        <p:nvSpPr>
+          <p:cNvPr id="3" name="Notes Placeholder 2"/>
+          <p:cNvSpPr>
+            <a:spLocks noGrp="1"/>
+          </p:cNvSpPr>
+          <p:nvPr>
+            <p:ph type="body" idx="1"/>
+          </p:nvPr>
+        </p:nvSpPr>
+        <p:spPr/>
+        <p:txBody>
+          <a:bodyPr/>
+          <a:lstStyle/>
+          <a:p>
+            <a:pPr marL="171450" indent="-171450">
+              <a:buFontTx/>
+              <a:buChar char="-"/>
+            </a:pPr>
+            <a:r>
+              <a:rPr lang="en-AU" dirty="0"/>
+              <a:t>Karma typescript pre-processor a bit dated. Use custom version. </a:t>
+            </a:r>
+          </a:p>
+          <a:p>
+            <a:pPr marL="171450" indent="-171450">
+              <a:buFontTx/>
+              <a:buChar char="-"/>
+            </a:pPr>
+            <a:r>
+              <a:rPr lang="en-AU" dirty="0"/>
+              <a:t>Still can’t get rid of some errors</a:t>
+            </a:r>
+          </a:p>
+          <a:p>
+            <a:pPr marL="171450" indent="-171450">
+              <a:buFontTx/>
+              <a:buChar char="-"/>
+            </a:pPr>
+            <a:r>
+              <a:rPr lang="en-AU" dirty="0"/>
+              <a:t>Use familiar jasmine framework</a:t>
+            </a:r>
+          </a:p>
+        </p:txBody>
+      </p:sp>
+      <p:sp>
+        <p:nvSpPr>
+          <p:cNvPr id="4" name="Slide Number Placeholder 3"/>
+          <p:cNvSpPr>
+            <a:spLocks noGrp="1"/>
+          </p:cNvSpPr>
+          <p:nvPr>
+            <p:ph type="sldNum" sz="quarter" idx="10"/>
+          </p:nvPr>
+        </p:nvSpPr>
+        <p:spPr/>
+        <p:txBody>
+          <a:bodyPr/>
+          <a:lstStyle/>
+          <a:p>
+            <a:fld id="{0070A078-10BE-47CC-A058-89BE94A69865}" type="slidenum">
+              <a:rPr lang="en-AU" smtClean="0"/>
+              <a:t>5</a:t>
+            </a:fld>
+            <a:endParaRPr lang="en-AU"/>
+          </a:p>
+        </p:txBody>
+      </p:sp>
+    </p:spTree>
+    <p:extLst>
+      <p:ext uri="{BB962C8B-B14F-4D97-AF65-F5344CB8AC3E}">
+        <p14:creationId xmlns:p14="http://schemas.microsoft.com/office/powerpoint/2010/main" val="2034623237"/>
+      </p:ext>
+    </p:extLst>
+  </p:cSld>
+  <p:clrMapOvr>
+    <a:masterClrMapping/>
+  </p:clrMapOvr>
+</p:notes>
+</file>
+
+<file path=ppt/notesSlides/notesSlide5.xml><?xml version="1.0" encoding="utf-8"?>
+<p:notes xmlns:a="http://schemas.openxmlformats.org/drawingml/2006/main" xmlns:r="http://schemas.openxmlformats.org/officeDocument/2006/relationships" xmlns:p="http://schemas.openxmlformats.org/presentationml/2006/main">
+  <p:cSld>
+    <p:spTree>
+      <p:nvGrpSpPr>
+        <p:cNvPr id="1" name=""/>
+        <p:cNvGrpSpPr/>
+        <p:nvPr/>
+      </p:nvGrpSpPr>
+      <p:grpSpPr>
+        <a:xfrm>
+          <a:off x="0" y="0"/>
+          <a:ext cx="0" cy="0"/>
+          <a:chOff x="0" y="0"/>
+          <a:chExt cx="0" cy="0"/>
+        </a:xfrm>
+      </p:grpSpPr>
+      <p:sp>
+        <p:nvSpPr>
+          <p:cNvPr id="2" name="Slide Image Placeholder 1"/>
+          <p:cNvSpPr>
+            <a:spLocks noGrp="1" noRot="1" noChangeAspect="1"/>
+          </p:cNvSpPr>
+          <p:nvPr>
+            <p:ph type="sldImg"/>
+          </p:nvPr>
+        </p:nvSpPr>
+        <p:spPr/>
+      </p:sp>
+      <p:sp>
+        <p:nvSpPr>
+          <p:cNvPr id="3" name="Notes Placeholder 2"/>
+          <p:cNvSpPr>
+            <a:spLocks noGrp="1"/>
+          </p:cNvSpPr>
+          <p:nvPr>
+            <p:ph type="body" idx="1"/>
+          </p:nvPr>
+        </p:nvSpPr>
+        <p:spPr/>
+        <p:txBody>
+          <a:bodyPr/>
+          <a:lstStyle/>
+          <a:p>
+            <a:pPr marL="171450" indent="-171450">
+              <a:buFontTx/>
+              <a:buChar char="-"/>
+            </a:pPr>
+            <a:r>
+              <a:rPr lang="en-AU" dirty="0" err="1"/>
+              <a:t>KnockoutJS</a:t>
+            </a:r>
+            <a:r>
+              <a:rPr lang="en-AU" dirty="0"/>
+              <a:t> components are MVVM – </a:t>
+            </a:r>
+            <a:r>
+              <a:rPr lang="en-AU" dirty="0" err="1"/>
+              <a:t>viewmodel</a:t>
+            </a:r>
+            <a:r>
+              <a:rPr lang="en-AU" dirty="0"/>
+              <a:t> and html </a:t>
+            </a:r>
+          </a:p>
+          <a:p>
+            <a:pPr marL="171450" indent="-171450">
+              <a:buFontTx/>
+              <a:buChar char="-"/>
+            </a:pPr>
+            <a:r>
+              <a:rPr lang="en-AU" dirty="0" err="1"/>
+              <a:t>KncokoutJS</a:t>
+            </a:r>
+            <a:r>
+              <a:rPr lang="en-AU" dirty="0"/>
+              <a:t> can load html from</a:t>
+            </a:r>
+          </a:p>
+          <a:p>
+            <a:pPr marL="628650" lvl="1" indent="-171450">
+              <a:buFontTx/>
+              <a:buChar char="-"/>
+            </a:pPr>
+            <a:r>
+              <a:rPr lang="en-AU" dirty="0"/>
+              <a:t>Tag</a:t>
+            </a:r>
+          </a:p>
+          <a:p>
+            <a:pPr marL="628650" lvl="1" indent="-171450">
+              <a:buFontTx/>
+              <a:buChar char="-"/>
+            </a:pPr>
+            <a:r>
+              <a:rPr lang="en-AU" dirty="0"/>
+              <a:t>Asynchronously</a:t>
+            </a:r>
+          </a:p>
+          <a:p>
+            <a:pPr marL="628650" lvl="1" indent="-171450">
+              <a:buFontTx/>
+              <a:buChar char="-"/>
+            </a:pPr>
+            <a:r>
+              <a:rPr lang="en-AU" dirty="0"/>
+              <a:t>Integrates with </a:t>
+            </a:r>
+            <a:r>
+              <a:rPr lang="en-AU" dirty="0" err="1"/>
+              <a:t>browserify</a:t>
+            </a:r>
+            <a:endParaRPr lang="en-AU" dirty="0"/>
+          </a:p>
+          <a:p>
+            <a:pPr marL="628650" lvl="1" indent="-171450">
+              <a:buFontTx/>
+              <a:buChar char="-"/>
+            </a:pPr>
+            <a:r>
+              <a:rPr lang="en-AU" dirty="0"/>
+              <a:t>Can also take a </a:t>
+            </a:r>
+            <a:r>
+              <a:rPr lang="en-AU" dirty="0" err="1"/>
+              <a:t>javascript</a:t>
+            </a:r>
+            <a:r>
+              <a:rPr lang="en-AU" dirty="0"/>
+              <a:t> string </a:t>
+            </a:r>
+            <a:r>
+              <a:rPr lang="en-AU" dirty="0">
+                <a:sym typeface="Wingdings" panose="05000000000000000000" pitchFamily="2" charset="2"/>
+              </a:rPr>
+              <a:t></a:t>
+            </a:r>
+          </a:p>
+          <a:p>
+            <a:pPr marL="171450" lvl="0" indent="-171450">
+              <a:buFontTx/>
+              <a:buChar char="-"/>
+            </a:pPr>
+            <a:r>
+              <a:rPr lang="en-AU" dirty="0">
+                <a:sym typeface="Wingdings" panose="05000000000000000000" pitchFamily="2" charset="2"/>
+              </a:rPr>
+              <a:t>Html-to-</a:t>
+            </a:r>
+            <a:r>
+              <a:rPr lang="en-AU" dirty="0" err="1">
+                <a:sym typeface="Wingdings" panose="05000000000000000000" pitchFamily="2" charset="2"/>
+              </a:rPr>
+              <a:t>json</a:t>
+            </a:r>
+            <a:r>
+              <a:rPr lang="en-AU" dirty="0">
+                <a:sym typeface="Wingdings" panose="05000000000000000000" pitchFamily="2" charset="2"/>
+              </a:rPr>
+              <a:t> – converts html files to strings and sticks them on a </a:t>
+            </a:r>
+            <a:r>
+              <a:rPr lang="en-AU" dirty="0" err="1">
+                <a:sym typeface="Wingdings" panose="05000000000000000000" pitchFamily="2" charset="2"/>
+              </a:rPr>
+              <a:t>javascript</a:t>
+            </a:r>
+            <a:r>
+              <a:rPr lang="en-AU" dirty="0">
+                <a:sym typeface="Wingdings" panose="05000000000000000000" pitchFamily="2" charset="2"/>
+              </a:rPr>
+              <a:t> property</a:t>
+            </a:r>
+          </a:p>
+          <a:p>
+            <a:pPr marL="171450" lvl="0" indent="-171450">
+              <a:buFontTx/>
+              <a:buChar char="-"/>
+            </a:pPr>
+            <a:endParaRPr lang="en-AU" dirty="0"/>
+          </a:p>
+          <a:p>
+            <a:pPr marL="171450" lvl="0" indent="-171450">
+              <a:buFontTx/>
+              <a:buChar char="-"/>
+            </a:pPr>
+            <a:endParaRPr lang="en-AU" dirty="0"/>
+          </a:p>
+        </p:txBody>
+      </p:sp>
+      <p:sp>
+        <p:nvSpPr>
+          <p:cNvPr id="4" name="Slide Number Placeholder 3"/>
+          <p:cNvSpPr>
+            <a:spLocks noGrp="1"/>
+          </p:cNvSpPr>
+          <p:nvPr>
+            <p:ph type="sldNum" sz="quarter" idx="10"/>
+          </p:nvPr>
+        </p:nvSpPr>
+        <p:spPr/>
+        <p:txBody>
+          <a:bodyPr/>
+          <a:lstStyle/>
+          <a:p>
+            <a:fld id="{0070A078-10BE-47CC-A058-89BE94A69865}" type="slidenum">
+              <a:rPr lang="en-AU" smtClean="0"/>
+              <a:t>6</a:t>
+            </a:fld>
+            <a:endParaRPr lang="en-AU"/>
+          </a:p>
+        </p:txBody>
+      </p:sp>
+    </p:spTree>
+    <p:extLst>
+      <p:ext uri="{BB962C8B-B14F-4D97-AF65-F5344CB8AC3E}">
+        <p14:creationId xmlns:p14="http://schemas.microsoft.com/office/powerpoint/2010/main" val="3418045640"/>
+      </p:ext>
+    </p:extLst>
+  </p:cSld>
+  <p:clrMapOvr>
+    <a:masterClrMapping/>
+  </p:clrMapOvr>
+</p:notes>
+</file>
+
+<file path=ppt/notesSlides/notesSlide6.xml><?xml version="1.0" encoding="utf-8"?>
+<p:notes xmlns:a="http://schemas.openxmlformats.org/drawingml/2006/main" xmlns:r="http://schemas.openxmlformats.org/officeDocument/2006/relationships" xmlns:p="http://schemas.openxmlformats.org/presentationml/2006/main">
+  <p:cSld>
+    <p:spTree>
+      <p:nvGrpSpPr>
+        <p:cNvPr id="1" name=""/>
+        <p:cNvGrpSpPr/>
+        <p:nvPr/>
+      </p:nvGrpSpPr>
+      <p:grpSpPr>
+        <a:xfrm>
+          <a:off x="0" y="0"/>
+          <a:ext cx="0" cy="0"/>
+          <a:chOff x="0" y="0"/>
+          <a:chExt cx="0" cy="0"/>
+        </a:xfrm>
+      </p:grpSpPr>
+      <p:sp>
+        <p:nvSpPr>
+          <p:cNvPr id="2" name="Slide Image Placeholder 1"/>
+          <p:cNvSpPr>
+            <a:spLocks noGrp="1" noRot="1" noChangeAspect="1"/>
+          </p:cNvSpPr>
+          <p:nvPr>
+            <p:ph type="sldImg"/>
+          </p:nvPr>
+        </p:nvSpPr>
+        <p:spPr/>
+      </p:sp>
+      <p:sp>
+        <p:nvSpPr>
+          <p:cNvPr id="3" name="Notes Placeholder 2"/>
+          <p:cNvSpPr>
+            <a:spLocks noGrp="1"/>
+          </p:cNvSpPr>
+          <p:nvPr>
+            <p:ph type="body" idx="1"/>
+          </p:nvPr>
+        </p:nvSpPr>
+        <p:spPr/>
+        <p:txBody>
+          <a:bodyPr/>
+          <a:lstStyle/>
+          <a:p>
+            <a:pPr marL="171450" indent="-171450">
+              <a:buFontTx/>
+              <a:buChar char="-"/>
+            </a:pPr>
+            <a:r>
+              <a:rPr lang="en-AU" dirty="0"/>
+              <a:t>Routing separates navigation concern from application code</a:t>
+            </a:r>
+          </a:p>
+          <a:p>
+            <a:pPr marL="171450" indent="-171450">
+              <a:buFontTx/>
+              <a:buChar char="-"/>
+            </a:pPr>
+            <a:r>
+              <a:rPr lang="en-AU" dirty="0" err="1"/>
+              <a:t>CrossroadsJs</a:t>
+            </a:r>
+            <a:r>
+              <a:rPr lang="en-AU" dirty="0"/>
+              <a:t> </a:t>
+            </a:r>
+          </a:p>
+          <a:p>
+            <a:pPr marL="628650" lvl="1" indent="-171450">
+              <a:buFontTx/>
+              <a:buChar char="-"/>
+            </a:pPr>
+            <a:r>
+              <a:rPr lang="en-AU" dirty="0"/>
+              <a:t>calls a function when a route is matched</a:t>
+            </a:r>
+          </a:p>
+          <a:p>
+            <a:pPr marL="628650" lvl="1" indent="-171450">
+              <a:buFontTx/>
+              <a:buChar char="-"/>
+            </a:pPr>
+            <a:r>
+              <a:rPr lang="en-AU" dirty="0"/>
+              <a:t>can provide query string variables</a:t>
+            </a:r>
+          </a:p>
+          <a:p>
+            <a:pPr marL="628650" lvl="1" indent="-171450">
+              <a:buFontTx/>
+              <a:buChar char="-"/>
+            </a:pPr>
+            <a:r>
+              <a:rPr lang="en-AU" dirty="0"/>
+              <a:t>can provide </a:t>
+            </a:r>
+            <a:r>
+              <a:rPr lang="en-AU" dirty="0" err="1"/>
+              <a:t>url</a:t>
+            </a:r>
+            <a:r>
+              <a:rPr lang="en-AU" dirty="0"/>
+              <a:t> segments as variables</a:t>
+            </a:r>
+          </a:p>
+          <a:p>
+            <a:pPr marL="171450" indent="-171450">
+              <a:buFontTx/>
+              <a:buChar char="-"/>
+            </a:pPr>
+            <a:r>
+              <a:rPr lang="en-AU" dirty="0" err="1"/>
+              <a:t>HistoryJs</a:t>
+            </a:r>
+            <a:r>
+              <a:rPr lang="en-AU" dirty="0"/>
+              <a:t> enables using back/forward browser buttons</a:t>
+            </a:r>
+          </a:p>
+          <a:p>
+            <a:pPr marL="171450" indent="-171450">
+              <a:buFontTx/>
+              <a:buChar char="-"/>
+            </a:pPr>
+            <a:r>
+              <a:rPr lang="en-AU" dirty="0"/>
+              <a:t>Use a global hyperlink click event handler to </a:t>
+            </a:r>
+          </a:p>
+          <a:p>
+            <a:pPr marL="628650" lvl="1" indent="-171450">
+              <a:buFontTx/>
+              <a:buChar char="-"/>
+            </a:pPr>
+            <a:r>
+              <a:rPr lang="en-AU" dirty="0"/>
+              <a:t>Push next </a:t>
+            </a:r>
+            <a:r>
+              <a:rPr lang="en-AU" dirty="0" err="1"/>
+              <a:t>url</a:t>
+            </a:r>
+            <a:r>
+              <a:rPr lang="en-AU" dirty="0"/>
+              <a:t> on browser history</a:t>
+            </a:r>
+          </a:p>
+          <a:p>
+            <a:pPr marL="628650" lvl="1" indent="-171450">
+              <a:buFontTx/>
+              <a:buChar char="-"/>
+            </a:pPr>
+            <a:r>
+              <a:rPr lang="en-AU" dirty="0"/>
+              <a:t>Load component with route matching</a:t>
+            </a:r>
+          </a:p>
+          <a:p>
+            <a:pPr marL="171450" lvl="0" indent="-171450">
+              <a:buFontTx/>
+              <a:buChar char="-"/>
+            </a:pPr>
+            <a:r>
+              <a:rPr lang="en-AU" dirty="0"/>
+              <a:t>Need to tackle this complexity once</a:t>
+            </a:r>
+          </a:p>
+          <a:p>
+            <a:pPr marL="171450" lvl="0" indent="-171450">
+              <a:buFontTx/>
+              <a:buChar char="-"/>
+            </a:pPr>
+            <a:r>
+              <a:rPr lang="en-AU" dirty="0"/>
+              <a:t>Separate into</a:t>
+            </a:r>
+          </a:p>
+          <a:p>
+            <a:pPr marL="628650" lvl="1" indent="-171450">
+              <a:buFontTx/>
+              <a:buChar char="-"/>
+            </a:pPr>
+            <a:r>
+              <a:rPr lang="en-AU" dirty="0"/>
+              <a:t>Core Router</a:t>
+            </a:r>
+          </a:p>
+          <a:p>
+            <a:pPr marL="628650" lvl="1" indent="-171450">
+              <a:buFontTx/>
+              <a:buChar char="-"/>
+            </a:pPr>
+            <a:r>
+              <a:rPr lang="en-AU" dirty="0"/>
+              <a:t>SPA specific Router</a:t>
+            </a:r>
+          </a:p>
+          <a:p>
+            <a:pPr marL="171450" lvl="0" indent="-171450">
+              <a:buFontTx/>
+              <a:buChar char="-"/>
+            </a:pPr>
+            <a:endParaRPr lang="en-AU" dirty="0"/>
+          </a:p>
+        </p:txBody>
+      </p:sp>
+      <p:sp>
+        <p:nvSpPr>
+          <p:cNvPr id="4" name="Slide Number Placeholder 3"/>
+          <p:cNvSpPr>
+            <a:spLocks noGrp="1"/>
+          </p:cNvSpPr>
+          <p:nvPr>
+            <p:ph type="sldNum" sz="quarter" idx="10"/>
+          </p:nvPr>
+        </p:nvSpPr>
+        <p:spPr/>
+        <p:txBody>
+          <a:bodyPr/>
+          <a:lstStyle/>
+          <a:p>
+            <a:fld id="{0070A078-10BE-47CC-A058-89BE94A69865}" type="slidenum">
+              <a:rPr lang="en-AU" smtClean="0"/>
+              <a:t>7</a:t>
+            </a:fld>
+            <a:endParaRPr lang="en-AU"/>
+          </a:p>
+        </p:txBody>
+      </p:sp>
+    </p:spTree>
+    <p:extLst>
+      <p:ext uri="{BB962C8B-B14F-4D97-AF65-F5344CB8AC3E}">
+        <p14:creationId xmlns:p14="http://schemas.microsoft.com/office/powerpoint/2010/main" val="3355310110"/>
+      </p:ext>
+    </p:extLst>
+  </p:cSld>
+  <p:clrMapOvr>
+    <a:masterClrMapping/>
+  </p:clrMapOvr>
+</p:notes>
+</file>
+
+<file path=ppt/notesSlides/notesSlide7.xml><?xml version="1.0" encoding="utf-8"?>
+<p:notes xmlns:a="http://schemas.openxmlformats.org/drawingml/2006/main" xmlns:r="http://schemas.openxmlformats.org/officeDocument/2006/relationships" xmlns:p="http://schemas.openxmlformats.org/presentationml/2006/main">
+  <p:cSld>
+    <p:spTree>
+      <p:nvGrpSpPr>
+        <p:cNvPr id="1" name=""/>
+        <p:cNvGrpSpPr/>
+        <p:nvPr/>
+      </p:nvGrpSpPr>
+      <p:grpSpPr>
+        <a:xfrm>
+          <a:off x="0" y="0"/>
+          <a:ext cx="0" cy="0"/>
+          <a:chOff x="0" y="0"/>
+          <a:chExt cx="0" cy="0"/>
+        </a:xfrm>
+      </p:grpSpPr>
+      <p:sp>
+        <p:nvSpPr>
+          <p:cNvPr id="2" name="Slide Image Placeholder 1"/>
+          <p:cNvSpPr>
+            <a:spLocks noGrp="1" noRot="1" noChangeAspect="1"/>
+          </p:cNvSpPr>
+          <p:nvPr>
+            <p:ph type="sldImg"/>
+          </p:nvPr>
+        </p:nvSpPr>
+        <p:spPr/>
+      </p:sp>
+      <p:sp>
+        <p:nvSpPr>
+          <p:cNvPr id="3" name="Notes Placeholder 2"/>
+          <p:cNvSpPr>
+            <a:spLocks noGrp="1"/>
+          </p:cNvSpPr>
+          <p:nvPr>
+            <p:ph type="body" idx="1"/>
+          </p:nvPr>
+        </p:nvSpPr>
+        <p:spPr/>
+        <p:txBody>
+          <a:bodyPr/>
+          <a:lstStyle/>
+          <a:p>
+            <a:pPr marL="171450" indent="-171450">
+              <a:buFontTx/>
+              <a:buChar char="-"/>
+            </a:pPr>
+            <a:r>
+              <a:rPr lang="en-AU" dirty="0" err="1"/>
+              <a:t>Cachebuster</a:t>
+            </a:r>
+            <a:r>
+              <a:rPr lang="en-AU" dirty="0"/>
+              <a:t> to generate a unique hash</a:t>
+            </a:r>
+          </a:p>
+          <a:p>
+            <a:pPr marL="171450" indent="-171450">
+              <a:buFontTx/>
+              <a:buChar char="-"/>
+            </a:pPr>
+            <a:r>
+              <a:rPr lang="en-AU" dirty="0" err="1"/>
+              <a:t>Sourcemaps</a:t>
+            </a:r>
+            <a:r>
+              <a:rPr lang="en-AU" dirty="0"/>
+              <a:t> to debug code in production</a:t>
+            </a:r>
+          </a:p>
+          <a:p>
+            <a:pPr marL="171450" indent="-171450">
+              <a:buFontTx/>
+              <a:buChar char="-"/>
+            </a:pPr>
+            <a:r>
+              <a:rPr lang="en-AU" dirty="0" err="1"/>
+              <a:t>Typings</a:t>
+            </a:r>
+            <a:r>
+              <a:rPr lang="en-AU" dirty="0"/>
+              <a:t> to reuse code</a:t>
+            </a:r>
+          </a:p>
+        </p:txBody>
+      </p:sp>
+      <p:sp>
+        <p:nvSpPr>
+          <p:cNvPr id="4" name="Slide Number Placeholder 3"/>
+          <p:cNvSpPr>
+            <a:spLocks noGrp="1"/>
+          </p:cNvSpPr>
+          <p:nvPr>
+            <p:ph type="sldNum" sz="quarter" idx="10"/>
+          </p:nvPr>
+        </p:nvSpPr>
+        <p:spPr/>
+        <p:txBody>
+          <a:bodyPr/>
+          <a:lstStyle/>
+          <a:p>
+            <a:fld id="{0070A078-10BE-47CC-A058-89BE94A69865}" type="slidenum">
+              <a:rPr lang="en-AU" smtClean="0"/>
+              <a:t>8</a:t>
+            </a:fld>
+            <a:endParaRPr lang="en-AU"/>
+          </a:p>
+        </p:txBody>
+      </p:sp>
+    </p:spTree>
+    <p:extLst>
+      <p:ext uri="{BB962C8B-B14F-4D97-AF65-F5344CB8AC3E}">
+        <p14:creationId xmlns:p14="http://schemas.microsoft.com/office/powerpoint/2010/main" val="4257340942"/>
+      </p:ext>
+    </p:extLst>
+  </p:cSld>
+  <p:clrMapOvr>
+    <a:masterClrMapping/>
+  </p:clrMapOvr>
+</p:notes>
+</file>
+
+<file path=ppt/notesSlides/notesSlide8.xml><?xml version="1.0" encoding="utf-8"?>
+<p:notes xmlns:a="http://schemas.openxmlformats.org/drawingml/2006/main" xmlns:r="http://schemas.openxmlformats.org/officeDocument/2006/relationships" xmlns:p="http://schemas.openxmlformats.org/presentationml/2006/main">
+  <p:cSld>
+    <p:spTree>
+      <p:nvGrpSpPr>
+        <p:cNvPr id="1" name=""/>
+        <p:cNvGrpSpPr/>
+        <p:nvPr/>
+      </p:nvGrpSpPr>
+      <p:grpSpPr>
+        <a:xfrm>
+          <a:off x="0" y="0"/>
+          <a:ext cx="0" cy="0"/>
+          <a:chOff x="0" y="0"/>
+          <a:chExt cx="0" cy="0"/>
+        </a:xfrm>
+      </p:grpSpPr>
+      <p:sp>
+        <p:nvSpPr>
+          <p:cNvPr id="2" name="Slide Image Placeholder 1"/>
+          <p:cNvSpPr>
+            <a:spLocks noGrp="1" noRot="1" noChangeAspect="1"/>
+          </p:cNvSpPr>
+          <p:nvPr>
+            <p:ph type="sldImg"/>
+          </p:nvPr>
+        </p:nvSpPr>
+        <p:spPr/>
+      </p:sp>
+      <p:sp>
+        <p:nvSpPr>
+          <p:cNvPr id="3" name="Notes Placeholder 2"/>
+          <p:cNvSpPr>
+            <a:spLocks noGrp="1"/>
+          </p:cNvSpPr>
+          <p:nvPr>
+            <p:ph type="body" idx="1"/>
+          </p:nvPr>
+        </p:nvSpPr>
+        <p:spPr/>
+        <p:txBody>
+          <a:bodyPr/>
+          <a:lstStyle/>
+          <a:p>
+            <a:pPr marL="171450" indent="-171450">
+              <a:buFontTx/>
+              <a:buChar char="-"/>
+            </a:pPr>
+            <a:r>
+              <a:rPr lang="en-AU" dirty="0"/>
+              <a:t>Knockout composition requires some glue code to be written. People forget</a:t>
+            </a:r>
+          </a:p>
+          <a:p>
+            <a:pPr marL="171450" indent="-171450">
+              <a:buFontTx/>
+              <a:buChar char="-"/>
+            </a:pPr>
+            <a:r>
+              <a:rPr lang="en-AU" dirty="0"/>
+              <a:t>Components are asynchronous. Harder to do things like do something when </a:t>
+            </a:r>
+            <a:r>
+              <a:rPr lang="en-AU" dirty="0" err="1"/>
+              <a:t>viewmodel</a:t>
+            </a:r>
+            <a:r>
+              <a:rPr lang="en-AU" dirty="0"/>
+              <a:t> is created. Constructor initialisation promise may resolve at some point in future</a:t>
+            </a:r>
+          </a:p>
+          <a:p>
+            <a:pPr marL="171450" indent="-171450">
+              <a:buFontTx/>
+              <a:buChar char="-"/>
+            </a:pPr>
+            <a:r>
+              <a:rPr lang="en-AU" dirty="0"/>
+              <a:t>Knockout binding engine is aging</a:t>
+            </a:r>
+          </a:p>
+          <a:p>
+            <a:pPr marL="171450" indent="-171450">
+              <a:buFontTx/>
+              <a:buChar char="-"/>
+            </a:pPr>
+            <a:endParaRPr lang="en-AU" dirty="0"/>
+          </a:p>
+        </p:txBody>
+      </p:sp>
+      <p:sp>
+        <p:nvSpPr>
+          <p:cNvPr id="4" name="Slide Number Placeholder 3"/>
+          <p:cNvSpPr>
+            <a:spLocks noGrp="1"/>
+          </p:cNvSpPr>
+          <p:nvPr>
+            <p:ph type="sldNum" sz="quarter" idx="10"/>
+          </p:nvPr>
+        </p:nvSpPr>
+        <p:spPr/>
+        <p:txBody>
+          <a:bodyPr/>
+          <a:lstStyle/>
+          <a:p>
+            <a:fld id="{0070A078-10BE-47CC-A058-89BE94A69865}" type="slidenum">
+              <a:rPr lang="en-AU" smtClean="0"/>
+              <a:t>9</a:t>
+            </a:fld>
+            <a:endParaRPr lang="en-AU"/>
+          </a:p>
+        </p:txBody>
+      </p:sp>
+    </p:spTree>
+    <p:extLst>
+      <p:ext uri="{BB962C8B-B14F-4D97-AF65-F5344CB8AC3E}">
+        <p14:creationId xmlns:p14="http://schemas.microsoft.com/office/powerpoint/2010/main" val="1588002417"/>
+      </p:ext>
+    </p:extLst>
+  </p:cSld>
+  <p:clrMapOvr>
+    <a:masterClrMapping/>
+  </p:clrMapOvr>
+</p:notes>
 </file>
 
 <file path=ppt/slideLayouts/slideLayout1.xml><?xml version="1.0" encoding="utf-8"?>
@@ -146,15 +1728,17 @@
         </p:nvSpPr>
         <p:spPr>
           <a:xfrm>
-            <a:off x="1524000" y="1122363"/>
-            <a:ext cx="9144000" cy="2387600"/>
+            <a:off x="2417779" y="802298"/>
+            <a:ext cx="8637073" cy="2541431"/>
           </a:xfrm>
         </p:spPr>
         <p:txBody>
-          <a:bodyPr anchor="b"/>
+          <a:bodyPr bIns="0" anchor="b">
+            <a:normAutofit/>
+          </a:bodyPr>
           <a:lstStyle>
-            <a:lvl1pPr algn="ctr">
-              <a:defRPr sz="6000"/>
+            <a:lvl1pPr algn="l">
+              <a:defRPr sz="6600"/>
             </a:lvl1pPr>
           </a:lstStyle>
           <a:p>
@@ -162,7 +1746,7 @@
               <a:rPr lang="en-US"/>
               <a:t>Click to edit Master title style</a:t>
             </a:r>
-            <a:endParaRPr lang="en-AU"/>
+            <a:endParaRPr lang="en-US" dirty="0"/>
           </a:p>
         </p:txBody>
       </p:sp>
@@ -178,20 +1762,26 @@
         </p:nvSpPr>
         <p:spPr>
           <a:xfrm>
-            <a:off x="1524000" y="3602038"/>
-            <a:ext cx="9144000" cy="1655762"/>
+            <a:off x="2417780" y="3531204"/>
+            <a:ext cx="8637072" cy="977621"/>
           </a:xfrm>
         </p:spPr>
         <p:txBody>
-          <a:bodyPr/>
+          <a:bodyPr tIns="91440" bIns="91440">
+            <a:normAutofit/>
+          </a:bodyPr>
           <a:lstStyle>
-            <a:lvl1pPr marL="0" indent="0" algn="ctr">
+            <a:lvl1pPr marL="0" indent="0" algn="l">
               <a:buNone/>
-              <a:defRPr sz="2400"/>
+              <a:defRPr sz="1800" b="0" cap="all" baseline="0">
+                <a:solidFill>
+                  <a:schemeClr val="tx1"/>
+                </a:solidFill>
+              </a:defRPr>
             </a:lvl1pPr>
             <a:lvl2pPr marL="457200" indent="0" algn="ctr">
               <a:buNone/>
-              <a:defRPr sz="2000"/>
+              <a:defRPr sz="1800"/>
             </a:lvl2pPr>
             <a:lvl3pPr marL="914400" indent="0" algn="ctr">
               <a:buNone/>
@@ -227,7 +1817,7 @@
               <a:rPr lang="en-US"/>
               <a:t>Click to edit Master subtitle style</a:t>
             </a:r>
-            <a:endParaRPr lang="en-AU"/>
+            <a:endParaRPr lang="en-US" dirty="0"/>
           </a:p>
         </p:txBody>
       </p:sp>
@@ -248,7 +1838,7 @@
           <a:p>
             <a:fld id="{DD50146C-7A60-4E83-8514-3C4D6ACB491F}" type="datetimeFigureOut">
               <a:rPr lang="en-AU" smtClean="0"/>
-              <a:t>31/07/2017</a:t>
+              <a:t>25/09/2017</a:t>
             </a:fld>
             <a:endParaRPr lang="en-AU"/>
           </a:p>
@@ -264,7 +1854,12 @@
             <p:ph type="ftr" sz="quarter" idx="11"/>
           </p:nvPr>
         </p:nvSpPr>
-        <p:spPr/>
+        <p:spPr>
+          <a:xfrm>
+            <a:off x="2416500" y="329307"/>
+            <a:ext cx="4973915" cy="309201"/>
+          </a:xfrm>
+        </p:spPr>
         <p:txBody>
           <a:bodyPr/>
           <a:lstStyle/>
@@ -283,7 +1878,12 @@
             <p:ph type="sldNum" sz="quarter" idx="12"/>
           </p:nvPr>
         </p:nvSpPr>
-        <p:spPr/>
+        <p:spPr>
+          <a:xfrm>
+            <a:off x="1437664" y="798973"/>
+            <a:ext cx="811019" cy="503578"/>
+          </a:xfrm>
+        </p:spPr>
         <p:txBody>
           <a:bodyPr/>
           <a:lstStyle/>
@@ -296,10 +1896,41 @@
           </a:p>
         </p:txBody>
       </p:sp>
+      <p:cxnSp>
+        <p:nvCxnSpPr>
+          <p:cNvPr id="15" name="Straight Connector 14"/>
+          <p:cNvCxnSpPr/>
+          <p:nvPr/>
+        </p:nvCxnSpPr>
+        <p:spPr>
+          <a:xfrm>
+            <a:off x="2417780" y="3528542"/>
+            <a:ext cx="8637072" cy="0"/>
+          </a:xfrm>
+          <a:prstGeom prst="line">
+            <a:avLst/>
+          </a:prstGeom>
+          <a:ln w="31750"/>
+        </p:spPr>
+        <p:style>
+          <a:lnRef idx="3">
+            <a:schemeClr val="accent1"/>
+          </a:lnRef>
+          <a:fillRef idx="0">
+            <a:schemeClr val="accent1"/>
+          </a:fillRef>
+          <a:effectRef idx="2">
+            <a:schemeClr val="accent1"/>
+          </a:effectRef>
+          <a:fontRef idx="minor">
+            <a:schemeClr val="tx1"/>
+          </a:fontRef>
+        </p:style>
+      </p:cxnSp>
     </p:spTree>
     <p:extLst>
       <p:ext uri="{BB962C8B-B14F-4D97-AF65-F5344CB8AC3E}">
-        <p14:creationId xmlns:p14="http://schemas.microsoft.com/office/powerpoint/2010/main" val="1779210349"/>
+        <p14:creationId xmlns:p14="http://schemas.microsoft.com/office/powerpoint/2010/main" val="3638461401"/>
       </p:ext>
     </p:extLst>
   </p:cSld>
@@ -345,7 +1976,7 @@
               <a:rPr lang="en-US"/>
               <a:t>Click to edit Master title style</a:t>
             </a:r>
-            <a:endParaRPr lang="en-AU"/>
+            <a:endParaRPr lang="en-US" dirty="0"/>
           </a:p>
         </p:txBody>
       </p:sp>
@@ -397,7 +2028,7 @@
               <a:rPr lang="en-US"/>
               <a:t>Fifth level</a:t>
             </a:r>
-            <a:endParaRPr lang="en-AU"/>
+            <a:endParaRPr lang="en-US" dirty="0"/>
           </a:p>
         </p:txBody>
       </p:sp>
@@ -418,7 +2049,7 @@
           <a:p>
             <a:fld id="{DD50146C-7A60-4E83-8514-3C4D6ACB491F}" type="datetimeFigureOut">
               <a:rPr lang="en-AU" smtClean="0"/>
-              <a:t>31/07/2017</a:t>
+              <a:t>25/09/2017</a:t>
             </a:fld>
             <a:endParaRPr lang="en-AU"/>
           </a:p>
@@ -466,10 +2097,41 @@
           </a:p>
         </p:txBody>
       </p:sp>
+      <p:cxnSp>
+        <p:nvCxnSpPr>
+          <p:cNvPr id="26" name="Straight Connector 25"/>
+          <p:cNvCxnSpPr/>
+          <p:nvPr/>
+        </p:nvCxnSpPr>
+        <p:spPr>
+          <a:xfrm>
+            <a:off x="1453896" y="1847088"/>
+            <a:ext cx="9607522" cy="0"/>
+          </a:xfrm>
+          <a:prstGeom prst="line">
+            <a:avLst/>
+          </a:prstGeom>
+          <a:ln w="31750"/>
+        </p:spPr>
+        <p:style>
+          <a:lnRef idx="3">
+            <a:schemeClr val="accent1"/>
+          </a:lnRef>
+          <a:fillRef idx="0">
+            <a:schemeClr val="accent1"/>
+          </a:fillRef>
+          <a:effectRef idx="2">
+            <a:schemeClr val="accent1"/>
+          </a:effectRef>
+          <a:fontRef idx="minor">
+            <a:schemeClr val="tx1"/>
+          </a:fontRef>
+        </p:style>
+      </p:cxnSp>
     </p:spTree>
     <p:extLst>
       <p:ext uri="{BB962C8B-B14F-4D97-AF65-F5344CB8AC3E}">
-        <p14:creationId xmlns:p14="http://schemas.microsoft.com/office/powerpoint/2010/main" val="1391577764"/>
+        <p14:creationId xmlns:p14="http://schemas.microsoft.com/office/powerpoint/2010/main" val="1233832895"/>
       </p:ext>
     </p:extLst>
   </p:cSld>
@@ -508,19 +2170,23 @@
         </p:nvSpPr>
         <p:spPr>
           <a:xfrm>
-            <a:off x="8724900" y="365125"/>
-            <a:ext cx="2628900" cy="5811838"/>
+            <a:off x="9439111" y="798973"/>
+            <a:ext cx="1615742" cy="4659889"/>
           </a:xfrm>
         </p:spPr>
         <p:txBody>
           <a:bodyPr vert="eaVert"/>
-          <a:lstStyle/>
+          <a:lstStyle>
+            <a:lvl1pPr algn="l">
+              <a:defRPr/>
+            </a:lvl1pPr>
+          </a:lstStyle>
           <a:p>
             <a:r>
               <a:rPr lang="en-US"/>
               <a:t>Click to edit Master title style</a:t>
             </a:r>
-            <a:endParaRPr lang="en-AU"/>
+            <a:endParaRPr lang="en-US" dirty="0"/>
           </a:p>
         </p:txBody>
       </p:sp>
@@ -536,8 +2202,8 @@
         </p:nvSpPr>
         <p:spPr>
           <a:xfrm>
-            <a:off x="838200" y="365125"/>
-            <a:ext cx="7734300" cy="5811838"/>
+            <a:off x="1444672" y="798973"/>
+            <a:ext cx="7828830" cy="4659889"/>
           </a:xfrm>
         </p:spPr>
         <p:txBody>
@@ -577,7 +2243,7 @@
               <a:rPr lang="en-US"/>
               <a:t>Fifth level</a:t>
             </a:r>
-            <a:endParaRPr lang="en-AU"/>
+            <a:endParaRPr lang="en-US" dirty="0"/>
           </a:p>
         </p:txBody>
       </p:sp>
@@ -598,7 +2264,7 @@
           <a:p>
             <a:fld id="{DD50146C-7A60-4E83-8514-3C4D6ACB491F}" type="datetimeFigureOut">
               <a:rPr lang="en-AU" smtClean="0"/>
-              <a:t>31/07/2017</a:t>
+              <a:t>25/09/2017</a:t>
             </a:fld>
             <a:endParaRPr lang="en-AU"/>
           </a:p>
@@ -646,10 +2312,41 @@
           </a:p>
         </p:txBody>
       </p:sp>
+      <p:cxnSp>
+        <p:nvCxnSpPr>
+          <p:cNvPr id="15" name="Straight Connector 14"/>
+          <p:cNvCxnSpPr/>
+          <p:nvPr/>
+        </p:nvCxnSpPr>
+        <p:spPr>
+          <a:xfrm>
+            <a:off x="9439111" y="798973"/>
+            <a:ext cx="0" cy="4659889"/>
+          </a:xfrm>
+          <a:prstGeom prst="line">
+            <a:avLst/>
+          </a:prstGeom>
+          <a:ln w="31750"/>
+        </p:spPr>
+        <p:style>
+          <a:lnRef idx="3">
+            <a:schemeClr val="accent1"/>
+          </a:lnRef>
+          <a:fillRef idx="0">
+            <a:schemeClr val="accent1"/>
+          </a:fillRef>
+          <a:effectRef idx="2">
+            <a:schemeClr val="accent1"/>
+          </a:effectRef>
+          <a:fontRef idx="minor">
+            <a:schemeClr val="tx1"/>
+          </a:fontRef>
+        </p:style>
+      </p:cxnSp>
     </p:spTree>
     <p:extLst>
       <p:ext uri="{BB962C8B-B14F-4D97-AF65-F5344CB8AC3E}">
-        <p14:creationId xmlns:p14="http://schemas.microsoft.com/office/powerpoint/2010/main" val="3330114935"/>
+        <p14:creationId xmlns:p14="http://schemas.microsoft.com/office/powerpoint/2010/main" val="3548916123"/>
       </p:ext>
     </p:extLst>
   </p:cSld>
@@ -695,7 +2392,7 @@
               <a:rPr lang="en-US"/>
               <a:t>Click to edit Master title style</a:t>
             </a:r>
-            <a:endParaRPr lang="en-AU"/>
+            <a:endParaRPr lang="en-US" dirty="0"/>
           </a:p>
         </p:txBody>
       </p:sp>
@@ -711,7 +2408,7 @@
         </p:nvSpPr>
         <p:spPr/>
         <p:txBody>
-          <a:bodyPr/>
+          <a:bodyPr anchor="t"/>
           <a:lstStyle/>
           <a:p>
             <a:pPr lvl="0"/>
@@ -747,7 +2444,7 @@
               <a:rPr lang="en-US"/>
               <a:t>Fifth level</a:t>
             </a:r>
-            <a:endParaRPr lang="en-AU"/>
+            <a:endParaRPr lang="en-US" dirty="0"/>
           </a:p>
         </p:txBody>
       </p:sp>
@@ -768,7 +2465,7 @@
           <a:p>
             <a:fld id="{DD50146C-7A60-4E83-8514-3C4D6ACB491F}" type="datetimeFigureOut">
               <a:rPr lang="en-AU" smtClean="0"/>
-              <a:t>31/07/2017</a:t>
+              <a:t>25/09/2017</a:t>
             </a:fld>
             <a:endParaRPr lang="en-AU"/>
           </a:p>
@@ -816,10 +2513,41 @@
           </a:p>
         </p:txBody>
       </p:sp>
+      <p:cxnSp>
+        <p:nvCxnSpPr>
+          <p:cNvPr id="33" name="Straight Connector 32"/>
+          <p:cNvCxnSpPr/>
+          <p:nvPr/>
+        </p:nvCxnSpPr>
+        <p:spPr>
+          <a:xfrm>
+            <a:off x="1453896" y="1847088"/>
+            <a:ext cx="9607522" cy="0"/>
+          </a:xfrm>
+          <a:prstGeom prst="line">
+            <a:avLst/>
+          </a:prstGeom>
+          <a:ln w="31750"/>
+        </p:spPr>
+        <p:style>
+          <a:lnRef idx="3">
+            <a:schemeClr val="accent1"/>
+          </a:lnRef>
+          <a:fillRef idx="0">
+            <a:schemeClr val="accent1"/>
+          </a:fillRef>
+          <a:effectRef idx="2">
+            <a:schemeClr val="accent1"/>
+          </a:effectRef>
+          <a:fontRef idx="minor">
+            <a:schemeClr val="tx1"/>
+          </a:fontRef>
+        </p:style>
+      </p:cxnSp>
     </p:spTree>
     <p:extLst>
       <p:ext uri="{BB962C8B-B14F-4D97-AF65-F5344CB8AC3E}">
-        <p14:creationId xmlns:p14="http://schemas.microsoft.com/office/powerpoint/2010/main" val="1135433681"/>
+        <p14:creationId xmlns:p14="http://schemas.microsoft.com/office/powerpoint/2010/main" val="1254927613"/>
       </p:ext>
     </p:extLst>
   </p:cSld>
@@ -858,15 +2586,17 @@
         </p:nvSpPr>
         <p:spPr>
           <a:xfrm>
-            <a:off x="831850" y="1709738"/>
-            <a:ext cx="10515600" cy="2852737"/>
+            <a:off x="1454239" y="1756130"/>
+            <a:ext cx="8643154" cy="1887950"/>
           </a:xfrm>
         </p:spPr>
         <p:txBody>
-          <a:bodyPr anchor="b"/>
+          <a:bodyPr anchor="b">
+            <a:normAutofit/>
+          </a:bodyPr>
           <a:lstStyle>
-            <a:lvl1pPr>
-              <a:defRPr sz="6000"/>
+            <a:lvl1pPr algn="l">
+              <a:defRPr sz="3600"/>
             </a:lvl1pPr>
           </a:lstStyle>
           <a:p>
@@ -874,7 +2604,7 @@
               <a:rPr lang="en-US"/>
               <a:t>Click to edit Master title style</a:t>
             </a:r>
-            <a:endParaRPr lang="en-AU"/>
+            <a:endParaRPr lang="en-US" dirty="0"/>
           </a:p>
         </p:txBody>
       </p:sp>
@@ -890,26 +2620,26 @@
         </p:nvSpPr>
         <p:spPr>
           <a:xfrm>
-            <a:off x="831850" y="4589463"/>
-            <a:ext cx="10515600" cy="1500187"/>
+            <a:off x="1454239" y="3806195"/>
+            <a:ext cx="8630446" cy="1012929"/>
           </a:xfrm>
         </p:spPr>
         <p:txBody>
-          <a:bodyPr/>
+          <a:bodyPr tIns="91440">
+            <a:normAutofit/>
+          </a:bodyPr>
           <a:lstStyle>
-            <a:lvl1pPr marL="0" indent="0">
+            <a:lvl1pPr marL="0" indent="0" algn="l">
               <a:buNone/>
-              <a:defRPr sz="2400">
+              <a:defRPr sz="1800">
                 <a:solidFill>
-                  <a:schemeClr val="tx1">
-                    <a:tint val="75000"/>
-                  </a:schemeClr>
+                  <a:schemeClr val="tx1"/>
                 </a:solidFill>
               </a:defRPr>
             </a:lvl1pPr>
             <a:lvl2pPr marL="457200" indent="0">
               <a:buNone/>
-              <a:defRPr sz="2000">
+              <a:defRPr sz="1800">
                 <a:solidFill>
                   <a:schemeClr val="tx1">
                     <a:tint val="75000"/>
@@ -1014,7 +2744,7 @@
           <a:p>
             <a:fld id="{DD50146C-7A60-4E83-8514-3C4D6ACB491F}" type="datetimeFigureOut">
               <a:rPr lang="en-AU" smtClean="0"/>
-              <a:t>31/07/2017</a:t>
+              <a:t>25/09/2017</a:t>
             </a:fld>
             <a:endParaRPr lang="en-AU"/>
           </a:p>
@@ -1062,10 +2792,41 @@
           </a:p>
         </p:txBody>
       </p:sp>
+      <p:cxnSp>
+        <p:nvCxnSpPr>
+          <p:cNvPr id="15" name="Straight Connector 14"/>
+          <p:cNvCxnSpPr/>
+          <p:nvPr/>
+        </p:nvCxnSpPr>
+        <p:spPr>
+          <a:xfrm>
+            <a:off x="1454239" y="3804985"/>
+            <a:ext cx="8630446" cy="0"/>
+          </a:xfrm>
+          <a:prstGeom prst="line">
+            <a:avLst/>
+          </a:prstGeom>
+          <a:ln w="31750"/>
+        </p:spPr>
+        <p:style>
+          <a:lnRef idx="3">
+            <a:schemeClr val="accent1"/>
+          </a:lnRef>
+          <a:fillRef idx="0">
+            <a:schemeClr val="accent1"/>
+          </a:fillRef>
+          <a:effectRef idx="2">
+            <a:schemeClr val="accent1"/>
+          </a:effectRef>
+          <a:fontRef idx="minor">
+            <a:schemeClr val="tx1"/>
+          </a:fontRef>
+        </p:style>
+      </p:cxnSp>
     </p:spTree>
     <p:extLst>
       <p:ext uri="{BB962C8B-B14F-4D97-AF65-F5344CB8AC3E}">
-        <p14:creationId xmlns:p14="http://schemas.microsoft.com/office/powerpoint/2010/main" val="1875431747"/>
+        <p14:creationId xmlns:p14="http://schemas.microsoft.com/office/powerpoint/2010/main" val="1083089003"/>
       </p:ext>
     </p:extLst>
   </p:cSld>
@@ -1102,7 +2863,12 @@
             <p:ph type="title"/>
           </p:nvPr>
         </p:nvSpPr>
-        <p:spPr/>
+        <p:spPr>
+          <a:xfrm>
+            <a:off x="1449217" y="804889"/>
+            <a:ext cx="9605635" cy="1059305"/>
+          </a:xfrm>
+        </p:spPr>
         <p:txBody>
           <a:bodyPr/>
           <a:lstStyle/>
@@ -1111,7 +2877,7 @@
               <a:rPr lang="en-US"/>
               <a:t>Click to edit Master title style</a:t>
             </a:r>
-            <a:endParaRPr lang="en-AU"/>
+            <a:endParaRPr lang="en-US" dirty="0"/>
           </a:p>
         </p:txBody>
       </p:sp>
@@ -1127,8 +2893,8 @@
         </p:nvSpPr>
         <p:spPr>
           <a:xfrm>
-            <a:off x="838200" y="1825625"/>
-            <a:ext cx="5181600" cy="4351338"/>
+            <a:off x="1447331" y="2010878"/>
+            <a:ext cx="4645152" cy="3448595"/>
           </a:xfrm>
         </p:spPr>
         <p:txBody>
@@ -1168,7 +2934,7 @@
               <a:rPr lang="en-US"/>
               <a:t>Fifth level</a:t>
             </a:r>
-            <a:endParaRPr lang="en-AU"/>
+            <a:endParaRPr lang="en-US" dirty="0"/>
           </a:p>
         </p:txBody>
       </p:sp>
@@ -1184,8 +2950,8 @@
         </p:nvSpPr>
         <p:spPr>
           <a:xfrm>
-            <a:off x="6172200" y="1825625"/>
-            <a:ext cx="5181600" cy="4351338"/>
+            <a:off x="6413771" y="2017343"/>
+            <a:ext cx="4645152" cy="3441520"/>
           </a:xfrm>
         </p:spPr>
         <p:txBody>
@@ -1225,7 +2991,7 @@
               <a:rPr lang="en-US"/>
               <a:t>Fifth level</a:t>
             </a:r>
-            <a:endParaRPr lang="en-AU"/>
+            <a:endParaRPr lang="en-US" dirty="0"/>
           </a:p>
         </p:txBody>
       </p:sp>
@@ -1246,7 +3012,7 @@
           <a:p>
             <a:fld id="{DD50146C-7A60-4E83-8514-3C4D6ACB491F}" type="datetimeFigureOut">
               <a:rPr lang="en-AU" smtClean="0"/>
-              <a:t>31/07/2017</a:t>
+              <a:t>25/09/2017</a:t>
             </a:fld>
             <a:endParaRPr lang="en-AU"/>
           </a:p>
@@ -1294,10 +3060,41 @@
           </a:p>
         </p:txBody>
       </p:sp>
+      <p:cxnSp>
+        <p:nvCxnSpPr>
+          <p:cNvPr id="35" name="Straight Connector 34"/>
+          <p:cNvCxnSpPr/>
+          <p:nvPr/>
+        </p:nvCxnSpPr>
+        <p:spPr>
+          <a:xfrm>
+            <a:off x="1453896" y="1847088"/>
+            <a:ext cx="9607522" cy="0"/>
+          </a:xfrm>
+          <a:prstGeom prst="line">
+            <a:avLst/>
+          </a:prstGeom>
+          <a:ln w="31750"/>
+        </p:spPr>
+        <p:style>
+          <a:lnRef idx="3">
+            <a:schemeClr val="accent1"/>
+          </a:lnRef>
+          <a:fillRef idx="0">
+            <a:schemeClr val="accent1"/>
+          </a:fillRef>
+          <a:effectRef idx="2">
+            <a:schemeClr val="accent1"/>
+          </a:effectRef>
+          <a:fontRef idx="minor">
+            <a:schemeClr val="tx1"/>
+          </a:fontRef>
+        </p:style>
+      </p:cxnSp>
     </p:spTree>
     <p:extLst>
       <p:ext uri="{BB962C8B-B14F-4D97-AF65-F5344CB8AC3E}">
-        <p14:creationId xmlns:p14="http://schemas.microsoft.com/office/powerpoint/2010/main" val="2211762626"/>
+        <p14:creationId xmlns:p14="http://schemas.microsoft.com/office/powerpoint/2010/main" val="3829307732"/>
       </p:ext>
     </p:extLst>
   </p:cSld>
@@ -1336,8 +3133,8 @@
         </p:nvSpPr>
         <p:spPr>
           <a:xfrm>
-            <a:off x="839788" y="365125"/>
-            <a:ext cx="10515600" cy="1325563"/>
+            <a:off x="1447191" y="804163"/>
+            <a:ext cx="9607661" cy="1056319"/>
           </a:xfrm>
         </p:spPr>
         <p:txBody>
@@ -1348,7 +3145,7 @@
               <a:rPr lang="en-US"/>
               <a:t>Click to edit Master title style</a:t>
             </a:r>
-            <a:endParaRPr lang="en-AU"/>
+            <a:endParaRPr lang="en-US" dirty="0"/>
           </a:p>
         </p:txBody>
       </p:sp>
@@ -1364,16 +3161,25 @@
         </p:nvSpPr>
         <p:spPr>
           <a:xfrm>
-            <a:off x="839788" y="1681163"/>
-            <a:ext cx="5157787" cy="823912"/>
+            <a:off x="1447191" y="2019549"/>
+            <a:ext cx="4645152" cy="801943"/>
           </a:xfrm>
         </p:spPr>
         <p:txBody>
-          <a:bodyPr anchor="b"/>
+          <a:bodyPr anchor="b">
+            <a:normAutofit/>
+          </a:bodyPr>
           <a:lstStyle>
             <a:lvl1pPr marL="0" indent="0">
+              <a:lnSpc>
+                <a:spcPct val="100000"/>
+              </a:lnSpc>
               <a:buNone/>
-              <a:defRPr sz="2400" b="1"/>
+              <a:defRPr sz="2200" b="0" cap="all" baseline="0">
+                <a:solidFill>
+                  <a:schemeClr val="accent1"/>
+                </a:solidFill>
+              </a:defRPr>
             </a:lvl1pPr>
             <a:lvl2pPr marL="457200" indent="0">
               <a:buNone/>
@@ -1429,8 +3235,8 @@
         </p:nvSpPr>
         <p:spPr>
           <a:xfrm>
-            <a:off x="839788" y="2505075"/>
-            <a:ext cx="5157787" cy="3684588"/>
+            <a:off x="1447191" y="2824269"/>
+            <a:ext cx="4645152" cy="2644457"/>
           </a:xfrm>
         </p:spPr>
         <p:txBody>
@@ -1470,7 +3276,7 @@
               <a:rPr lang="en-US"/>
               <a:t>Fifth level</a:t>
             </a:r>
-            <a:endParaRPr lang="en-AU"/>
+            <a:endParaRPr lang="en-US" dirty="0"/>
           </a:p>
         </p:txBody>
       </p:sp>
@@ -1486,16 +3292,25 @@
         </p:nvSpPr>
         <p:spPr>
           <a:xfrm>
-            <a:off x="6172200" y="1681163"/>
-            <a:ext cx="5183188" cy="823912"/>
+            <a:off x="6412362" y="2023003"/>
+            <a:ext cx="4645152" cy="802237"/>
           </a:xfrm>
         </p:spPr>
         <p:txBody>
-          <a:bodyPr anchor="b"/>
+          <a:bodyPr anchor="b">
+            <a:normAutofit/>
+          </a:bodyPr>
           <a:lstStyle>
             <a:lvl1pPr marL="0" indent="0">
+              <a:lnSpc>
+                <a:spcPct val="100000"/>
+              </a:lnSpc>
               <a:buNone/>
-              <a:defRPr sz="2400" b="1"/>
+              <a:defRPr sz="2200" b="0" cap="all" baseline="0">
+                <a:solidFill>
+                  <a:schemeClr val="accent1"/>
+                </a:solidFill>
+              </a:defRPr>
             </a:lvl1pPr>
             <a:lvl2pPr marL="457200" indent="0">
               <a:buNone/>
@@ -1551,8 +3366,8 @@
         </p:nvSpPr>
         <p:spPr>
           <a:xfrm>
-            <a:off x="6172200" y="2505075"/>
-            <a:ext cx="5183188" cy="3684588"/>
+            <a:off x="6412362" y="2821491"/>
+            <a:ext cx="4645152" cy="2637371"/>
           </a:xfrm>
         </p:spPr>
         <p:txBody>
@@ -1592,7 +3407,7 @@
               <a:rPr lang="en-US"/>
               <a:t>Fifth level</a:t>
             </a:r>
-            <a:endParaRPr lang="en-AU"/>
+            <a:endParaRPr lang="en-US" dirty="0"/>
           </a:p>
         </p:txBody>
       </p:sp>
@@ -1613,7 +3428,7 @@
           <a:p>
             <a:fld id="{DD50146C-7A60-4E83-8514-3C4D6ACB491F}" type="datetimeFigureOut">
               <a:rPr lang="en-AU" smtClean="0"/>
-              <a:t>31/07/2017</a:t>
+              <a:t>25/09/2017</a:t>
             </a:fld>
             <a:endParaRPr lang="en-AU"/>
           </a:p>
@@ -1661,10 +3476,41 @@
           </a:p>
         </p:txBody>
       </p:sp>
+      <p:cxnSp>
+        <p:nvCxnSpPr>
+          <p:cNvPr id="29" name="Straight Connector 28"/>
+          <p:cNvCxnSpPr/>
+          <p:nvPr/>
+        </p:nvCxnSpPr>
+        <p:spPr>
+          <a:xfrm>
+            <a:off x="1453896" y="1847088"/>
+            <a:ext cx="9607522" cy="0"/>
+          </a:xfrm>
+          <a:prstGeom prst="line">
+            <a:avLst/>
+          </a:prstGeom>
+          <a:ln w="31750"/>
+        </p:spPr>
+        <p:style>
+          <a:lnRef idx="3">
+            <a:schemeClr val="accent1"/>
+          </a:lnRef>
+          <a:fillRef idx="0">
+            <a:schemeClr val="accent1"/>
+          </a:fillRef>
+          <a:effectRef idx="2">
+            <a:schemeClr val="accent1"/>
+          </a:effectRef>
+          <a:fontRef idx="minor">
+            <a:schemeClr val="tx1"/>
+          </a:fontRef>
+        </p:style>
+      </p:cxnSp>
     </p:spTree>
     <p:extLst>
       <p:ext uri="{BB962C8B-B14F-4D97-AF65-F5344CB8AC3E}">
-        <p14:creationId xmlns:p14="http://schemas.microsoft.com/office/powerpoint/2010/main" val="3263247824"/>
+        <p14:creationId xmlns:p14="http://schemas.microsoft.com/office/powerpoint/2010/main" val="4144569319"/>
       </p:ext>
     </p:extLst>
   </p:cSld>
@@ -1710,7 +3556,7 @@
               <a:rPr lang="en-US"/>
               <a:t>Click to edit Master title style</a:t>
             </a:r>
-            <a:endParaRPr lang="en-AU"/>
+            <a:endParaRPr lang="en-US" dirty="0"/>
           </a:p>
         </p:txBody>
       </p:sp>
@@ -1731,7 +3577,7 @@
           <a:p>
             <a:fld id="{DD50146C-7A60-4E83-8514-3C4D6ACB491F}" type="datetimeFigureOut">
               <a:rPr lang="en-AU" smtClean="0"/>
-              <a:t>31/07/2017</a:t>
+              <a:t>25/09/2017</a:t>
             </a:fld>
             <a:endParaRPr lang="en-AU"/>
           </a:p>
@@ -1779,10 +3625,41 @@
           </a:p>
         </p:txBody>
       </p:sp>
+      <p:cxnSp>
+        <p:nvCxnSpPr>
+          <p:cNvPr id="25" name="Straight Connector 24"/>
+          <p:cNvCxnSpPr/>
+          <p:nvPr/>
+        </p:nvCxnSpPr>
+        <p:spPr>
+          <a:xfrm>
+            <a:off x="1453896" y="1847088"/>
+            <a:ext cx="9607522" cy="0"/>
+          </a:xfrm>
+          <a:prstGeom prst="line">
+            <a:avLst/>
+          </a:prstGeom>
+          <a:ln w="31750"/>
+        </p:spPr>
+        <p:style>
+          <a:lnRef idx="3">
+            <a:schemeClr val="accent1"/>
+          </a:lnRef>
+          <a:fillRef idx="0">
+            <a:schemeClr val="accent1"/>
+          </a:fillRef>
+          <a:effectRef idx="2">
+            <a:schemeClr val="accent1"/>
+          </a:effectRef>
+          <a:fontRef idx="minor">
+            <a:schemeClr val="tx1"/>
+          </a:fontRef>
+        </p:style>
+      </p:cxnSp>
     </p:spTree>
     <p:extLst>
       <p:ext uri="{BB962C8B-B14F-4D97-AF65-F5344CB8AC3E}">
-        <p14:creationId xmlns:p14="http://schemas.microsoft.com/office/powerpoint/2010/main" val="2516545109"/>
+        <p14:creationId xmlns:p14="http://schemas.microsoft.com/office/powerpoint/2010/main" val="357792996"/>
       </p:ext>
     </p:extLst>
   </p:cSld>
@@ -1826,7 +3703,7 @@
           <a:p>
             <a:fld id="{DD50146C-7A60-4E83-8514-3C4D6ACB491F}" type="datetimeFigureOut">
               <a:rPr lang="en-AU" smtClean="0"/>
-              <a:t>31/07/2017</a:t>
+              <a:t>25/09/2017</a:t>
             </a:fld>
             <a:endParaRPr lang="en-AU"/>
           </a:p>
@@ -1877,7 +3754,7 @@
     </p:spTree>
     <p:extLst>
       <p:ext uri="{BB962C8B-B14F-4D97-AF65-F5344CB8AC3E}">
-        <p14:creationId xmlns:p14="http://schemas.microsoft.com/office/powerpoint/2010/main" val="1461313239"/>
+        <p14:creationId xmlns:p14="http://schemas.microsoft.com/office/powerpoint/2010/main" val="1559953929"/>
       </p:ext>
     </p:extLst>
   </p:cSld>
@@ -1916,15 +3793,17 @@
         </p:nvSpPr>
         <p:spPr>
           <a:xfrm>
-            <a:off x="839788" y="457200"/>
-            <a:ext cx="3932237" cy="1600200"/>
+            <a:off x="1444671" y="798973"/>
+            <a:ext cx="3273099" cy="2247117"/>
           </a:xfrm>
         </p:spPr>
         <p:txBody>
-          <a:bodyPr anchor="b"/>
+          <a:bodyPr anchor="b">
+            <a:normAutofit/>
+          </a:bodyPr>
           <a:lstStyle>
-            <a:lvl1pPr>
-              <a:defRPr sz="3200"/>
+            <a:lvl1pPr algn="l">
+              <a:defRPr sz="2400"/>
             </a:lvl1pPr>
           </a:lstStyle>
           <a:p>
@@ -1932,7 +3811,7 @@
               <a:rPr lang="en-US"/>
               <a:t>Click to edit Master title style</a:t>
             </a:r>
-            <a:endParaRPr lang="en-AU"/>
+            <a:endParaRPr lang="en-US" dirty="0"/>
           </a:p>
         </p:txBody>
       </p:sp>
@@ -1948,41 +3827,13 @@
         </p:nvSpPr>
         <p:spPr>
           <a:xfrm>
-            <a:off x="5183188" y="987425"/>
-            <a:ext cx="6172200" cy="4873625"/>
+            <a:off x="5043714" y="798974"/>
+            <a:ext cx="6012470" cy="4658826"/>
           </a:xfrm>
         </p:spPr>
         <p:txBody>
-          <a:bodyPr/>
-          <a:lstStyle>
-            <a:lvl1pPr>
-              <a:defRPr sz="3200"/>
-            </a:lvl1pPr>
-            <a:lvl2pPr>
-              <a:defRPr sz="2800"/>
-            </a:lvl2pPr>
-            <a:lvl3pPr>
-              <a:defRPr sz="2400"/>
-            </a:lvl3pPr>
-            <a:lvl4pPr>
-              <a:defRPr sz="2000"/>
-            </a:lvl4pPr>
-            <a:lvl5pPr>
-              <a:defRPr sz="2000"/>
-            </a:lvl5pPr>
-            <a:lvl6pPr>
-              <a:defRPr sz="2000"/>
-            </a:lvl6pPr>
-            <a:lvl7pPr>
-              <a:defRPr sz="2000"/>
-            </a:lvl7pPr>
-            <a:lvl8pPr>
-              <a:defRPr sz="2000"/>
-            </a:lvl8pPr>
-            <a:lvl9pPr>
-              <a:defRPr sz="2000"/>
-            </a:lvl9pPr>
-          </a:lstStyle>
+          <a:bodyPr anchor="ctr"/>
+          <a:lstStyle/>
           <a:p>
             <a:pPr lvl="0"/>
             <a:r>
@@ -2017,7 +3868,7 @@
               <a:rPr lang="en-US"/>
               <a:t>Fifth level</a:t>
             </a:r>
-            <a:endParaRPr lang="en-AU"/>
+            <a:endParaRPr lang="en-US" dirty="0"/>
           </a:p>
         </p:txBody>
       </p:sp>
@@ -2033,14 +3884,14 @@
         </p:nvSpPr>
         <p:spPr>
           <a:xfrm>
-            <a:off x="839788" y="2057400"/>
-            <a:ext cx="3932237" cy="3811588"/>
+            <a:off x="1444671" y="3205491"/>
+            <a:ext cx="3275013" cy="2248181"/>
           </a:xfrm>
         </p:spPr>
         <p:txBody>
           <a:bodyPr/>
           <a:lstStyle>
-            <a:lvl1pPr marL="0" indent="0">
+            <a:lvl1pPr marL="0" indent="0" algn="l">
               <a:buNone/>
               <a:defRPr sz="1600"/>
             </a:lvl1pPr>
@@ -2103,7 +3954,7 @@
           <a:p>
             <a:fld id="{DD50146C-7A60-4E83-8514-3C4D6ACB491F}" type="datetimeFigureOut">
               <a:rPr lang="en-AU" smtClean="0"/>
-              <a:t>31/07/2017</a:t>
+              <a:t>25/09/2017</a:t>
             </a:fld>
             <a:endParaRPr lang="en-AU"/>
           </a:p>
@@ -2151,10 +4002,41 @@
           </a:p>
         </p:txBody>
       </p:sp>
+      <p:cxnSp>
+        <p:nvCxnSpPr>
+          <p:cNvPr id="17" name="Straight Connector 16"/>
+          <p:cNvCxnSpPr/>
+          <p:nvPr/>
+        </p:nvCxnSpPr>
+        <p:spPr>
+          <a:xfrm>
+            <a:off x="1448280" y="3205491"/>
+            <a:ext cx="3269490" cy="0"/>
+          </a:xfrm>
+          <a:prstGeom prst="line">
+            <a:avLst/>
+          </a:prstGeom>
+          <a:ln w="31750"/>
+        </p:spPr>
+        <p:style>
+          <a:lnRef idx="3">
+            <a:schemeClr val="accent1"/>
+          </a:lnRef>
+          <a:fillRef idx="0">
+            <a:schemeClr val="accent1"/>
+          </a:fillRef>
+          <a:effectRef idx="2">
+            <a:schemeClr val="accent1"/>
+          </a:effectRef>
+          <a:fontRef idx="minor">
+            <a:schemeClr val="tx1"/>
+          </a:fontRef>
+        </p:style>
+      </p:cxnSp>
     </p:spTree>
     <p:extLst>
       <p:ext uri="{BB962C8B-B14F-4D97-AF65-F5344CB8AC3E}">
-        <p14:creationId xmlns:p14="http://schemas.microsoft.com/office/powerpoint/2010/main" val="2645379197"/>
+        <p14:creationId xmlns:p14="http://schemas.microsoft.com/office/powerpoint/2010/main" val="1555560629"/>
       </p:ext>
     </p:extLst>
   </p:cSld>
@@ -2181,6 +4063,140 @@
           <a:chExt cx="0" cy="0"/>
         </a:xfrm>
       </p:grpSpPr>
+      <p:grpSp>
+        <p:nvGrpSpPr>
+          <p:cNvPr id="8" name="Group 7"/>
+          <p:cNvGrpSpPr/>
+          <p:nvPr/>
+        </p:nvGrpSpPr>
+        <p:grpSpPr>
+          <a:xfrm>
+            <a:off x="7477387" y="482170"/>
+            <a:ext cx="4074533" cy="5149101"/>
+            <a:chOff x="7477387" y="482170"/>
+            <a:chExt cx="4074533" cy="5149101"/>
+          </a:xfrm>
+        </p:grpSpPr>
+        <p:sp>
+          <p:nvSpPr>
+            <p:cNvPr id="18" name="Rectangle 17"/>
+            <p:cNvSpPr/>
+            <p:nvPr/>
+          </p:nvSpPr>
+          <p:spPr bwMode="black">
+            <a:xfrm>
+              <a:off x="7477387" y="482170"/>
+              <a:ext cx="4074533" cy="5149101"/>
+            </a:xfrm>
+            <a:prstGeom prst="rect">
+              <a:avLst/>
+            </a:prstGeom>
+            <a:gradFill>
+              <a:gsLst>
+                <a:gs pos="0">
+                  <a:srgbClr val="000001"/>
+                </a:gs>
+                <a:gs pos="100000">
+                  <a:srgbClr val="191919"/>
+                </a:gs>
+              </a:gsLst>
+            </a:gradFill>
+            <a:ln w="76200" cmpd="sng">
+              <a:noFill/>
+              <a:miter lim="800000"/>
+            </a:ln>
+            <a:effectLst>
+              <a:outerShdw blurRad="127000" dist="228600" dir="4740000" sx="98000" sy="98000" algn="tl" rotWithShape="0">
+                <a:srgbClr val="000000">
+                  <a:alpha val="34000"/>
+                </a:srgbClr>
+              </a:outerShdw>
+            </a:effectLst>
+            <a:scene3d>
+              <a:camera prst="orthographicFront"/>
+              <a:lightRig rig="threePt" dir="t"/>
+            </a:scene3d>
+            <a:sp3d>
+              <a:bevelT w="152400" h="50800" prst="softRound"/>
+            </a:sp3d>
+          </p:spPr>
+          <p:style>
+            <a:lnRef idx="1">
+              <a:schemeClr val="accent1"/>
+            </a:lnRef>
+            <a:fillRef idx="3">
+              <a:schemeClr val="accent1"/>
+            </a:fillRef>
+            <a:effectRef idx="2">
+              <a:schemeClr val="accent1"/>
+            </a:effectRef>
+            <a:fontRef idx="minor">
+              <a:schemeClr val="lt1"/>
+            </a:fontRef>
+          </p:style>
+        </p:sp>
+        <p:sp>
+          <p:nvSpPr>
+            <p:cNvPr id="19" name="Rectangle 18"/>
+            <p:cNvSpPr/>
+            <p:nvPr/>
+          </p:nvSpPr>
+          <p:spPr bwMode="blackWhite">
+            <a:xfrm>
+              <a:off x="7790446" y="812506"/>
+              <a:ext cx="3450289" cy="4466452"/>
+            </a:xfrm>
+            <a:prstGeom prst="rect">
+              <a:avLst/>
+            </a:prstGeom>
+            <a:gradFill>
+              <a:gsLst>
+                <a:gs pos="0">
+                  <a:srgbClr val="DADADA"/>
+                </a:gs>
+                <a:gs pos="100000">
+                  <a:srgbClr val="FFFFFE"/>
+                </a:gs>
+              </a:gsLst>
+              <a:lin ang="16200000" scaled="0"/>
+            </a:gradFill>
+            <a:ln w="50800" cmpd="sng">
+              <a:solidFill>
+                <a:srgbClr val="191919"/>
+              </a:solidFill>
+              <a:miter lim="800000"/>
+            </a:ln>
+            <a:effectLst>
+              <a:innerShdw blurRad="63500" dist="88900" dir="14100000">
+                <a:srgbClr val="000000">
+                  <a:alpha val="30000"/>
+                </a:srgbClr>
+              </a:innerShdw>
+            </a:effectLst>
+            <a:scene3d>
+              <a:camera prst="orthographicFront"/>
+              <a:lightRig rig="threePt" dir="t"/>
+            </a:scene3d>
+            <a:sp3d>
+              <a:bevelT prst="relaxedInset"/>
+            </a:sp3d>
+          </p:spPr>
+          <p:style>
+            <a:lnRef idx="1">
+              <a:schemeClr val="accent1"/>
+            </a:lnRef>
+            <a:fillRef idx="3">
+              <a:schemeClr val="accent1"/>
+            </a:fillRef>
+            <a:effectRef idx="2">
+              <a:schemeClr val="accent1"/>
+            </a:effectRef>
+            <a:fontRef idx="minor">
+              <a:schemeClr val="lt1"/>
+            </a:fontRef>
+          </p:style>
+        </p:sp>
+      </p:grpSp>
       <p:sp>
         <p:nvSpPr>
           <p:cNvPr id="2" name="Title 1"/>
@@ -2193,12 +4209,14 @@
         </p:nvSpPr>
         <p:spPr>
           <a:xfrm>
-            <a:off x="839788" y="457200"/>
-            <a:ext cx="3932237" cy="1600200"/>
+            <a:off x="1451206" y="1129513"/>
+            <a:ext cx="5532328" cy="1830584"/>
           </a:xfrm>
         </p:spPr>
         <p:txBody>
-          <a:bodyPr anchor="b"/>
+          <a:bodyPr anchor="b">
+            <a:normAutofit/>
+          </a:bodyPr>
           <a:lstStyle>
             <a:lvl1pPr>
               <a:defRPr sz="3200"/>
@@ -2209,7 +4227,7 @@
               <a:rPr lang="en-US"/>
               <a:t>Click to edit Master title style</a:t>
             </a:r>
-            <a:endParaRPr lang="en-AU"/>
+            <a:endParaRPr lang="en-US" dirty="0"/>
           </a:p>
         </p:txBody>
       </p:sp>
@@ -2217,7 +4235,7 @@
         <p:nvSpPr>
           <p:cNvPr id="3" name="Picture Placeholder 2"/>
           <p:cNvSpPr>
-            <a:spLocks noGrp="1"/>
+            <a:spLocks noGrp="1" noChangeAspect="1"/>
           </p:cNvSpPr>
           <p:nvPr>
             <p:ph type="pic" idx="1"/>
@@ -2225,14 +4243,24 @@
         </p:nvSpPr>
         <p:spPr>
           <a:xfrm>
-            <a:off x="5183188" y="987425"/>
-            <a:ext cx="6172200" cy="4873625"/>
+            <a:off x="8124389" y="1122542"/>
+            <a:ext cx="2791171" cy="3866327"/>
           </a:xfrm>
+          <a:solidFill>
+            <a:schemeClr val="bg1">
+              <a:lumMod val="85000"/>
+            </a:schemeClr>
+          </a:solidFill>
+          <a:ln w="9525" cap="sq">
+            <a:noFill/>
+            <a:miter lim="800000"/>
+          </a:ln>
+          <a:effectLst/>
         </p:spPr>
         <p:txBody>
-          <a:bodyPr/>
+          <a:bodyPr anchor="t"/>
           <a:lstStyle>
-            <a:lvl1pPr marL="0" indent="0">
+            <a:lvl1pPr marL="0" indent="0" algn="ctr">
               <a:buNone/>
               <a:defRPr sz="3200"/>
             </a:lvl1pPr>
@@ -2270,7 +4298,11 @@
             </a:lvl9pPr>
           </a:lstStyle>
           <a:p>
-            <a:endParaRPr lang="en-AU"/>
+            <a:r>
+              <a:rPr lang="en-US"/>
+              <a:t>Click icon to add picture</a:t>
+            </a:r>
+            <a:endParaRPr lang="en-US" dirty="0"/>
           </a:p>
         </p:txBody>
       </p:sp>
@@ -2286,16 +4318,18 @@
         </p:nvSpPr>
         <p:spPr>
           <a:xfrm>
-            <a:off x="839788" y="2057400"/>
-            <a:ext cx="3932237" cy="3811588"/>
+            <a:off x="1450329" y="3145992"/>
+            <a:ext cx="5524404" cy="2003742"/>
           </a:xfrm>
         </p:spPr>
         <p:txBody>
-          <a:bodyPr/>
+          <a:bodyPr>
+            <a:normAutofit/>
+          </a:bodyPr>
           <a:lstStyle>
-            <a:lvl1pPr marL="0" indent="0">
+            <a:lvl1pPr marL="0" indent="0" algn="l">
               <a:buNone/>
-              <a:defRPr sz="1600"/>
+              <a:defRPr sz="1800"/>
             </a:lvl1pPr>
             <a:lvl2pPr marL="457200" indent="0">
               <a:buNone/>
@@ -2349,14 +4383,23 @@
             <p:ph type="dt" sz="half" idx="10"/>
           </p:nvPr>
         </p:nvSpPr>
-        <p:spPr/>
-        <p:txBody>
-          <a:bodyPr/>
-          <a:lstStyle/>
+        <p:spPr>
+          <a:xfrm>
+            <a:off x="1447382" y="5469856"/>
+            <a:ext cx="5527351" cy="320123"/>
+          </a:xfrm>
+        </p:spPr>
+        <p:txBody>
+          <a:bodyPr/>
+          <a:lstStyle>
+            <a:lvl1pPr algn="l">
+              <a:defRPr/>
+            </a:lvl1pPr>
+          </a:lstStyle>
           <a:p>
             <a:fld id="{DD50146C-7A60-4E83-8514-3C4D6ACB491F}" type="datetimeFigureOut">
               <a:rPr lang="en-AU" smtClean="0"/>
-              <a:t>31/07/2017</a:t>
+              <a:t>25/09/2017</a:t>
             </a:fld>
             <a:endParaRPr lang="en-AU"/>
           </a:p>
@@ -2372,7 +4415,12 @@
             <p:ph type="ftr" sz="quarter" idx="11"/>
           </p:nvPr>
         </p:nvSpPr>
-        <p:spPr/>
+        <p:spPr>
+          <a:xfrm>
+            <a:off x="1447382" y="318640"/>
+            <a:ext cx="5541004" cy="320931"/>
+          </a:xfrm>
+        </p:spPr>
         <p:txBody>
           <a:bodyPr/>
           <a:lstStyle/>
@@ -2404,10 +4452,41 @@
           </a:p>
         </p:txBody>
       </p:sp>
+      <p:cxnSp>
+        <p:nvCxnSpPr>
+          <p:cNvPr id="31" name="Straight Connector 30"/>
+          <p:cNvCxnSpPr/>
+          <p:nvPr/>
+        </p:nvCxnSpPr>
+        <p:spPr>
+          <a:xfrm>
+            <a:off x="1447382" y="3143605"/>
+            <a:ext cx="5527351" cy="0"/>
+          </a:xfrm>
+          <a:prstGeom prst="line">
+            <a:avLst/>
+          </a:prstGeom>
+          <a:ln w="31750"/>
+        </p:spPr>
+        <p:style>
+          <a:lnRef idx="3">
+            <a:schemeClr val="accent1"/>
+          </a:lnRef>
+          <a:fillRef idx="0">
+            <a:schemeClr val="accent1"/>
+          </a:fillRef>
+          <a:effectRef idx="2">
+            <a:schemeClr val="accent1"/>
+          </a:effectRef>
+          <a:fontRef idx="minor">
+            <a:schemeClr val="tx1"/>
+          </a:fontRef>
+        </p:style>
+      </p:cxnSp>
     </p:spTree>
     <p:extLst>
       <p:ext uri="{BB962C8B-B14F-4D97-AF65-F5344CB8AC3E}">
-        <p14:creationId xmlns:p14="http://schemas.microsoft.com/office/powerpoint/2010/main" val="3536594964"/>
+        <p14:creationId xmlns:p14="http://schemas.microsoft.com/office/powerpoint/2010/main" val="2326530197"/>
       </p:ext>
     </p:extLst>
   </p:cSld>
@@ -2421,8 +4500,8 @@
 <p:sldMaster xmlns:a="http://schemas.openxmlformats.org/drawingml/2006/main" xmlns:r="http://schemas.openxmlformats.org/officeDocument/2006/relationships" xmlns:p="http://schemas.openxmlformats.org/presentationml/2006/main">
   <p:cSld>
     <p:bg>
-      <p:bgRef idx="1001">
-        <a:schemeClr val="bg1"/>
+      <p:bgRef idx="1003">
+        <a:schemeClr val="bg2"/>
       </p:bgRef>
     </p:bg>
     <p:spTree>
@@ -2441,123 +4520,200 @@
       </p:grpSpPr>
       <p:sp>
         <p:nvSpPr>
-          <p:cNvPr id="2" name="Title Placeholder 1"/>
-          <p:cNvSpPr>
-            <a:spLocks noGrp="1"/>
-          </p:cNvSpPr>
-          <p:nvPr>
-            <p:ph type="title"/>
-          </p:nvPr>
+          <p:cNvPr id="8" name="Rectangle 7"/>
+          <p:cNvSpPr/>
+          <p:nvPr/>
         </p:nvSpPr>
         <p:spPr>
           <a:xfrm>
-            <a:off x="838200" y="365125"/>
-            <a:ext cx="10515600" cy="1325563"/>
+            <a:off x="0" y="2019476"/>
+            <a:ext cx="12192000" cy="4105941"/>
+          </a:xfrm>
+          <a:prstGeom prst="rect">
+            <a:avLst/>
+          </a:prstGeom>
+          <a:gradFill flip="none" rotWithShape="1">
+            <a:gsLst>
+              <a:gs pos="0">
+                <a:schemeClr val="bg2">
+                  <a:alpha val="0"/>
+                </a:schemeClr>
+              </a:gs>
+              <a:gs pos="100000">
+                <a:schemeClr val="bg2"/>
+              </a:gs>
+            </a:gsLst>
+            <a:lin ang="5400000" scaled="0"/>
+            <a:tileRect/>
+          </a:gradFill>
+          <a:ln>
+            <a:noFill/>
+          </a:ln>
+        </p:spPr>
+        <p:style>
+          <a:lnRef idx="2">
+            <a:schemeClr val="accent1">
+              <a:shade val="50000"/>
+            </a:schemeClr>
+          </a:lnRef>
+          <a:fillRef idx="1">
+            <a:schemeClr val="accent1"/>
+          </a:fillRef>
+          <a:effectRef idx="0">
+            <a:schemeClr val="accent1"/>
+          </a:effectRef>
+          <a:fontRef idx="minor">
+            <a:schemeClr val="lt1"/>
+          </a:fontRef>
+        </p:style>
+      </p:sp>
+      <p:pic>
+        <p:nvPicPr>
+          <p:cNvPr id="7" name="Picture 6"/>
+          <p:cNvPicPr>
+            <a:picLocks noChangeAspect="1"/>
+          </p:cNvPicPr>
+          <p:nvPr/>
+        </p:nvPicPr>
+        <p:blipFill rotWithShape="1">
+          <a:blip r:embed="rId13">
+            <a:extLst>
+              <a:ext uri="{28A0092B-C50C-407E-A947-70E740481C1C}">
+                <a14:useLocalDpi xmlns:a14="http://schemas.microsoft.com/office/drawing/2010/main" val="0"/>
+              </a:ext>
+            </a:extLst>
+          </a:blip>
+          <a:srcRect t="1538" b="-1538"/>
+          <a:stretch/>
+        </p:blipFill>
+        <p:spPr bwMode="black">
+          <a:xfrm>
+            <a:off x="0" y="6126480"/>
+            <a:ext cx="12192000" cy="742950"/>
           </a:xfrm>
           <a:prstGeom prst="rect">
             <a:avLst/>
           </a:prstGeom>
         </p:spPr>
-        <p:txBody>
-          <a:bodyPr vert="horz" lIns="91440" tIns="45720" rIns="91440" bIns="45720" rtlCol="0" anchor="ctr">
-            <a:normAutofit/>
-          </a:bodyPr>
-          <a:lstStyle/>
-          <a:p>
-            <a:r>
-              <a:rPr lang="en-US"/>
-              <a:t>Click to edit Master title style</a:t>
-            </a:r>
-            <a:endParaRPr lang="en-AU"/>
-          </a:p>
-        </p:txBody>
-      </p:sp>
-      <p:sp>
-        <p:nvSpPr>
-          <p:cNvPr id="3" name="Text Placeholder 2"/>
-          <p:cNvSpPr>
-            <a:spLocks noGrp="1"/>
-          </p:cNvSpPr>
-          <p:nvPr>
-            <p:ph type="body" idx="1"/>
+      </p:pic>
+      <p:sp>
+        <p:nvSpPr>
+          <p:cNvPr id="2" name="Title Placeholder 1"/>
+          <p:cNvSpPr>
+            <a:spLocks noGrp="1"/>
+          </p:cNvSpPr>
+          <p:nvPr>
+            <p:ph type="title"/>
           </p:nvPr>
         </p:nvSpPr>
         <p:spPr>
           <a:xfrm>
-            <a:off x="838200" y="1825625"/>
-            <a:ext cx="10515600" cy="4351338"/>
+            <a:off x="1451579" y="804519"/>
+            <a:ext cx="9603275" cy="1049235"/>
           </a:xfrm>
           <a:prstGeom prst="rect">
             <a:avLst/>
           </a:prstGeom>
         </p:spPr>
         <p:txBody>
-          <a:bodyPr vert="horz" lIns="91440" tIns="45720" rIns="91440" bIns="45720" rtlCol="0">
+          <a:bodyPr vert="horz" lIns="91440" tIns="45720" rIns="91440" bIns="45720" rtlCol="0" anchor="t">
             <a:normAutofit/>
           </a:bodyPr>
           <a:lstStyle/>
           <a:p>
-            <a:pPr lvl="0"/>
             <a:r>
               <a:rPr lang="en-US"/>
-              <a:t>Edit Master text styles</a:t>
-            </a:r>
-          </a:p>
-          <a:p>
-            <a:pPr lvl="1"/>
-            <a:r>
-              <a:rPr lang="en-US"/>
-              <a:t>Second level</a:t>
-            </a:r>
-          </a:p>
-          <a:p>
-            <a:pPr lvl="2"/>
-            <a:r>
-              <a:rPr lang="en-US"/>
-              <a:t>Third level</a:t>
-            </a:r>
-          </a:p>
-          <a:p>
-            <a:pPr lvl="3"/>
-            <a:r>
-              <a:rPr lang="en-US"/>
-              <a:t>Fourth level</a:t>
-            </a:r>
-          </a:p>
-          <a:p>
-            <a:pPr lvl="4"/>
-            <a:r>
-              <a:rPr lang="en-US"/>
-              <a:t>Fifth level</a:t>
-            </a:r>
-            <a:endParaRPr lang="en-AU"/>
-          </a:p>
-        </p:txBody>
-      </p:sp>
-      <p:sp>
-        <p:nvSpPr>
-          <p:cNvPr id="4" name="Date Placeholder 3"/>
-          <p:cNvSpPr>
-            <a:spLocks noGrp="1"/>
-          </p:cNvSpPr>
-          <p:nvPr>
-            <p:ph type="dt" sz="half" idx="2"/>
+              <a:t>Click to edit Master title style</a:t>
+            </a:r>
+            <a:endParaRPr lang="en-US" dirty="0"/>
+          </a:p>
+        </p:txBody>
+      </p:sp>
+      <p:sp>
+        <p:nvSpPr>
+          <p:cNvPr id="3" name="Text Placeholder 2"/>
+          <p:cNvSpPr>
+            <a:spLocks noGrp="1"/>
+          </p:cNvSpPr>
+          <p:nvPr>
+            <p:ph type="body" idx="1"/>
           </p:nvPr>
         </p:nvSpPr>
         <p:spPr>
           <a:xfrm>
-            <a:off x="838200" y="6356350"/>
-            <a:ext cx="2743200" cy="365125"/>
+            <a:off x="1451579" y="2015732"/>
+            <a:ext cx="9603275" cy="3450613"/>
           </a:xfrm>
           <a:prstGeom prst="rect">
             <a:avLst/>
           </a:prstGeom>
         </p:spPr>
         <p:txBody>
+          <a:bodyPr vert="horz" lIns="91440" tIns="45720" rIns="91440" bIns="45720" rtlCol="0">
+            <a:normAutofit/>
+          </a:bodyPr>
+          <a:lstStyle/>
+          <a:p>
+            <a:pPr lvl="0"/>
+            <a:r>
+              <a:rPr lang="en-US" dirty="0"/>
+              <a:t>Edit Master text styles</a:t>
+            </a:r>
+          </a:p>
+          <a:p>
+            <a:pPr lvl="1"/>
+            <a:r>
+              <a:rPr lang="en-US" dirty="0"/>
+              <a:t>Second level</a:t>
+            </a:r>
+          </a:p>
+          <a:p>
+            <a:pPr lvl="2"/>
+            <a:r>
+              <a:rPr lang="en-US" dirty="0"/>
+              <a:t>Third level</a:t>
+            </a:r>
+          </a:p>
+          <a:p>
+            <a:pPr lvl="3"/>
+            <a:r>
+              <a:rPr lang="en-US" dirty="0"/>
+              <a:t>Fourth level</a:t>
+            </a:r>
+          </a:p>
+          <a:p>
+            <a:pPr lvl="4"/>
+            <a:r>
+              <a:rPr lang="en-US" dirty="0"/>
+              <a:t>Fifth level</a:t>
+            </a:r>
+          </a:p>
+        </p:txBody>
+      </p:sp>
+      <p:sp>
+        <p:nvSpPr>
+          <p:cNvPr id="4" name="Date Placeholder 3"/>
+          <p:cNvSpPr>
+            <a:spLocks noGrp="1"/>
+          </p:cNvSpPr>
+          <p:nvPr>
+            <p:ph type="dt" sz="half" idx="2"/>
+          </p:nvPr>
+        </p:nvSpPr>
+        <p:spPr>
+          <a:xfrm>
+            <a:off x="7554138" y="330370"/>
+            <a:ext cx="3500715" cy="309201"/>
+          </a:xfrm>
+          <a:prstGeom prst="rect">
+            <a:avLst/>
+          </a:prstGeom>
+        </p:spPr>
+        <p:txBody>
           <a:bodyPr vert="horz" lIns="91440" tIns="45720" rIns="91440" bIns="45720" rtlCol="0" anchor="ctr"/>
           <a:lstStyle>
-            <a:lvl1pPr algn="l">
-              <a:defRPr sz="1200">
+            <a:lvl1pPr algn="r">
+              <a:defRPr sz="1000">
                 <a:solidFill>
                   <a:schemeClr val="tx1">
                     <a:tint val="75000"/>
@@ -2569,7 +4725,7 @@
           <a:p>
             <a:fld id="{DD50146C-7A60-4E83-8514-3C4D6ACB491F}" type="datetimeFigureOut">
               <a:rPr lang="en-AU" smtClean="0"/>
-              <a:t>31/07/2017</a:t>
+              <a:t>25/09/2017</a:t>
             </a:fld>
             <a:endParaRPr lang="en-AU"/>
           </a:p>
@@ -2587,8 +4743,8 @@
         </p:nvSpPr>
         <p:spPr>
           <a:xfrm>
-            <a:off x="4038600" y="6356350"/>
-            <a:ext cx="4114800" cy="365125"/>
+            <a:off x="1451579" y="329307"/>
+            <a:ext cx="5938836" cy="309201"/>
           </a:xfrm>
           <a:prstGeom prst="rect">
             <a:avLst/>
@@ -2597,8 +4753,8 @@
         <p:txBody>
           <a:bodyPr vert="horz" lIns="91440" tIns="45720" rIns="91440" bIns="45720" rtlCol="0" anchor="ctr"/>
           <a:lstStyle>
-            <a:lvl1pPr algn="ctr">
-              <a:defRPr sz="1200">
+            <a:lvl1pPr algn="l">
+              <a:defRPr sz="1000">
                 <a:solidFill>
                   <a:schemeClr val="tx1">
                     <a:tint val="75000"/>
@@ -2624,22 +4780,20 @@
         </p:nvSpPr>
         <p:spPr>
           <a:xfrm>
-            <a:off x="8610600" y="6356350"/>
-            <a:ext cx="2743200" cy="365125"/>
+            <a:off x="480060" y="798973"/>
+            <a:ext cx="811019" cy="503578"/>
           </a:xfrm>
           <a:prstGeom prst="rect">
             <a:avLst/>
           </a:prstGeom>
         </p:spPr>
         <p:txBody>
-          <a:bodyPr vert="horz" lIns="91440" tIns="45720" rIns="91440" bIns="45720" rtlCol="0" anchor="ctr"/>
+          <a:bodyPr vert="horz" lIns="91440" tIns="45720" rIns="91440" bIns="45720" rtlCol="0" anchor="t"/>
           <a:lstStyle>
             <a:lvl1pPr algn="r">
-              <a:defRPr sz="1200">
+              <a:defRPr sz="2800">
                 <a:solidFill>
-                  <a:schemeClr val="tx1">
-                    <a:tint val="75000"/>
-                  </a:schemeClr>
+                  <a:schemeClr val="accent1"/>
                 </a:solidFill>
               </a:defRPr>
             </a:lvl1pPr>
@@ -2653,26 +4807,63 @@
           </a:p>
         </p:txBody>
       </p:sp>
+      <p:cxnSp>
+        <p:nvCxnSpPr>
+          <p:cNvPr id="10" name="Straight Connector 9"/>
+          <p:cNvCxnSpPr/>
+          <p:nvPr/>
+        </p:nvCxnSpPr>
+        <p:spPr>
+          <a:xfrm>
+            <a:off x="0" y="6128413"/>
+            <a:ext cx="12192000" cy="0"/>
+          </a:xfrm>
+          <a:prstGeom prst="line">
+            <a:avLst/>
+          </a:prstGeom>
+          <a:ln w="12700">
+            <a:solidFill>
+              <a:srgbClr val="000001">
+                <a:alpha val="20000"/>
+              </a:srgbClr>
+            </a:solidFill>
+          </a:ln>
+        </p:spPr>
+        <p:style>
+          <a:lnRef idx="1">
+            <a:schemeClr val="accent1"/>
+          </a:lnRef>
+          <a:fillRef idx="0">
+            <a:schemeClr val="accent1"/>
+          </a:fillRef>
+          <a:effectRef idx="0">
+            <a:schemeClr val="accent1"/>
+          </a:effectRef>
+          <a:fontRef idx="minor">
+            <a:schemeClr val="tx1"/>
+          </a:fontRef>
+        </p:style>
+      </p:cxnSp>
     </p:spTree>
     <p:extLst>
       <p:ext uri="{BB962C8B-B14F-4D97-AF65-F5344CB8AC3E}">
-        <p14:creationId xmlns:p14="http://schemas.microsoft.com/office/powerpoint/2010/main" val="534890647"/>
+        <p14:creationId xmlns:p14="http://schemas.microsoft.com/office/powerpoint/2010/main" val="645806216"/>
       </p:ext>
     </p:extLst>
   </p:cSld>
   <p:clrMap bg1="lt1" tx1="dk1" bg2="lt2" tx2="dk2" accent1="accent1" accent2="accent2" accent3="accent3" accent4="accent4" accent5="accent5" accent6="accent6" hlink="hlink" folHlink="folHlink"/>
   <p:sldLayoutIdLst>
-    <p:sldLayoutId id="2147483649" r:id="rId1"/>
-    <p:sldLayoutId id="2147483650" r:id="rId2"/>
-    <p:sldLayoutId id="2147483651" r:id="rId3"/>
-    <p:sldLayoutId id="2147483652" r:id="rId4"/>
-    <p:sldLayoutId id="2147483653" r:id="rId5"/>
-    <p:sldLayoutId id="2147483654" r:id="rId6"/>
-    <p:sldLayoutId id="2147483655" r:id="rId7"/>
-    <p:sldLayoutId id="2147483656" r:id="rId8"/>
-    <p:sldLayoutId id="2147483657" r:id="rId9"/>
-    <p:sldLayoutId id="2147483658" r:id="rId10"/>
-    <p:sldLayoutId id="2147483659" r:id="rId11"/>
+    <p:sldLayoutId id="2147483661" r:id="rId1"/>
+    <p:sldLayoutId id="2147483662" r:id="rId2"/>
+    <p:sldLayoutId id="2147483663" r:id="rId3"/>
+    <p:sldLayoutId id="2147483664" r:id="rId4"/>
+    <p:sldLayoutId id="2147483665" r:id="rId5"/>
+    <p:sldLayoutId id="2147483666" r:id="rId6"/>
+    <p:sldLayoutId id="2147483667" r:id="rId7"/>
+    <p:sldLayoutId id="2147483668" r:id="rId8"/>
+    <p:sldLayoutId id="2147483669" r:id="rId9"/>
+    <p:sldLayoutId id="2147483670" r:id="rId10"/>
+    <p:sldLayoutId id="2147483671" r:id="rId11"/>
   </p:sldLayoutIdLst>
   <p:txStyles>
     <p:titleStyle>
@@ -2684,10 +4875,11 @@
           <a:spcPct val="0"/>
         </a:spcBef>
         <a:buNone/>
-        <a:defRPr sz="4400" kern="1200">
+        <a:defRPr sz="3200" b="0" i="0" kern="1200" cap="all">
           <a:solidFill>
             <a:schemeClr val="tx1"/>
           </a:solidFill>
+          <a:effectLst/>
           <a:latin typeface="+mj-lt"/>
           <a:ea typeface="+mj-ea"/>
           <a:cs typeface="+mj-cs"/>
@@ -2697,17 +4889,22 @@
     <p:bodyStyle>
       <a:lvl1pPr marL="228600" indent="-228600" algn="l" defTabSz="914400" rtl="0" eaLnBrk="1" latinLnBrk="0" hangingPunct="1">
         <a:lnSpc>
-          <a:spcPct val="90000"/>
+          <a:spcPct val="120000"/>
         </a:lnSpc>
         <a:spcBef>
           <a:spcPts val="1000"/>
         </a:spcBef>
+        <a:buClr>
+          <a:schemeClr val="accent1"/>
+        </a:buClr>
+        <a:buSzPct val="100000"/>
         <a:buFont typeface="Arial" panose="020B0604020202020204" pitchFamily="34" charset="0"/>
         <a:buChar char="•"/>
-        <a:defRPr sz="2800" kern="1200">
+        <a:defRPr sz="2000" kern="1200">
           <a:solidFill>
             <a:schemeClr val="tx1"/>
           </a:solidFill>
+          <a:effectLst/>
           <a:latin typeface="+mn-lt"/>
           <a:ea typeface="+mn-ea"/>
           <a:cs typeface="+mn-cs"/>
@@ -2715,17 +4912,22 @@
       </a:lvl1pPr>
       <a:lvl2pPr marL="685800" indent="-228600" algn="l" defTabSz="914400" rtl="0" eaLnBrk="1" latinLnBrk="0" hangingPunct="1">
         <a:lnSpc>
-          <a:spcPct val="90000"/>
+          <a:spcPct val="120000"/>
         </a:lnSpc>
         <a:spcBef>
           <a:spcPts val="500"/>
         </a:spcBef>
+        <a:buClr>
+          <a:schemeClr val="accent1"/>
+        </a:buClr>
+        <a:buSzPct val="100000"/>
         <a:buFont typeface="Arial" panose="020B0604020202020204" pitchFamily="34" charset="0"/>
         <a:buChar char="•"/>
-        <a:defRPr sz="2400" kern="1200">
+        <a:defRPr sz="1800" kern="1200" cap="none" baseline="0">
           <a:solidFill>
             <a:schemeClr val="tx1"/>
           </a:solidFill>
+          <a:effectLst/>
           <a:latin typeface="+mn-lt"/>
           <a:ea typeface="+mn-ea"/>
           <a:cs typeface="+mn-cs"/>
@@ -2733,17 +4935,22 @@
       </a:lvl2pPr>
       <a:lvl3pPr marL="1143000" indent="-228600" algn="l" defTabSz="914400" rtl="0" eaLnBrk="1" latinLnBrk="0" hangingPunct="1">
         <a:lnSpc>
-          <a:spcPct val="90000"/>
+          <a:spcPct val="120000"/>
         </a:lnSpc>
         <a:spcBef>
           <a:spcPts val="500"/>
         </a:spcBef>
+        <a:buClr>
+          <a:schemeClr val="accent1"/>
+        </a:buClr>
+        <a:buSzPct val="100000"/>
         <a:buFont typeface="Arial" panose="020B0604020202020204" pitchFamily="34" charset="0"/>
         <a:buChar char="•"/>
-        <a:defRPr sz="2000" kern="1200">
+        <a:defRPr sz="1600" kern="1200">
           <a:solidFill>
             <a:schemeClr val="tx1"/>
           </a:solidFill>
+          <a:effectLst/>
           <a:latin typeface="+mn-lt"/>
           <a:ea typeface="+mn-ea"/>
           <a:cs typeface="+mn-cs"/>
@@ -2751,17 +4958,22 @@
       </a:lvl3pPr>
       <a:lvl4pPr marL="1600200" indent="-228600" algn="l" defTabSz="914400" rtl="0" eaLnBrk="1" latinLnBrk="0" hangingPunct="1">
         <a:lnSpc>
-          <a:spcPct val="90000"/>
+          <a:spcPct val="120000"/>
         </a:lnSpc>
         <a:spcBef>
           <a:spcPts val="500"/>
         </a:spcBef>
+        <a:buClr>
+          <a:schemeClr val="accent1"/>
+        </a:buClr>
+        <a:buSzPct val="100000"/>
         <a:buFont typeface="Arial" panose="020B0604020202020204" pitchFamily="34" charset="0"/>
         <a:buChar char="•"/>
-        <a:defRPr sz="1800" kern="1200">
+        <a:defRPr sz="1400" kern="1200" cap="none" baseline="0">
           <a:solidFill>
             <a:schemeClr val="tx1"/>
           </a:solidFill>
+          <a:effectLst/>
           <a:latin typeface="+mn-lt"/>
           <a:ea typeface="+mn-ea"/>
           <a:cs typeface="+mn-cs"/>
@@ -2769,17 +4981,22 @@
       </a:lvl4pPr>
       <a:lvl5pPr marL="2057400" indent="-228600" algn="l" defTabSz="914400" rtl="0" eaLnBrk="1" latinLnBrk="0" hangingPunct="1">
         <a:lnSpc>
-          <a:spcPct val="90000"/>
+          <a:spcPct val="120000"/>
         </a:lnSpc>
         <a:spcBef>
           <a:spcPts val="500"/>
         </a:spcBef>
+        <a:buClr>
+          <a:schemeClr val="accent1"/>
+        </a:buClr>
+        <a:buSzPct val="100000"/>
         <a:buFont typeface="Arial" panose="020B0604020202020204" pitchFamily="34" charset="0"/>
         <a:buChar char="•"/>
-        <a:defRPr sz="1800" kern="1200">
+        <a:defRPr sz="1200" kern="1200">
           <a:solidFill>
             <a:schemeClr val="tx1"/>
           </a:solidFill>
+          <a:effectLst/>
           <a:latin typeface="+mn-lt"/>
           <a:ea typeface="+mn-ea"/>
           <a:cs typeface="+mn-cs"/>
@@ -2787,17 +5004,22 @@
       </a:lvl5pPr>
       <a:lvl6pPr marL="2514600" indent="-228600" algn="l" defTabSz="914400" rtl="0" eaLnBrk="1" latinLnBrk="0" hangingPunct="1">
         <a:lnSpc>
-          <a:spcPct val="90000"/>
+          <a:spcPct val="120000"/>
         </a:lnSpc>
         <a:spcBef>
           <a:spcPts val="500"/>
         </a:spcBef>
+        <a:buClr>
+          <a:schemeClr val="accent1"/>
+        </a:buClr>
+        <a:buSzPct val="100000"/>
         <a:buFont typeface="Arial" panose="020B0604020202020204" pitchFamily="34" charset="0"/>
         <a:buChar char="•"/>
-        <a:defRPr sz="1800" kern="1200">
+        <a:defRPr sz="1200" kern="1200">
           <a:solidFill>
             <a:schemeClr val="tx1"/>
           </a:solidFill>
+          <a:effectLst/>
           <a:latin typeface="+mn-lt"/>
           <a:ea typeface="+mn-ea"/>
           <a:cs typeface="+mn-cs"/>
@@ -2805,17 +5027,22 @@
       </a:lvl6pPr>
       <a:lvl7pPr marL="2971800" indent="-228600" algn="l" defTabSz="914400" rtl="0" eaLnBrk="1" latinLnBrk="0" hangingPunct="1">
         <a:lnSpc>
-          <a:spcPct val="90000"/>
+          <a:spcPct val="120000"/>
         </a:lnSpc>
         <a:spcBef>
           <a:spcPts val="500"/>
         </a:spcBef>
+        <a:buClr>
+          <a:schemeClr val="accent1"/>
+        </a:buClr>
+        <a:buSzPct val="100000"/>
         <a:buFont typeface="Arial" panose="020B0604020202020204" pitchFamily="34" charset="0"/>
         <a:buChar char="•"/>
-        <a:defRPr sz="1800" kern="1200">
+        <a:defRPr sz="1200" kern="1200">
           <a:solidFill>
             <a:schemeClr val="tx1"/>
           </a:solidFill>
+          <a:effectLst/>
           <a:latin typeface="+mn-lt"/>
           <a:ea typeface="+mn-ea"/>
           <a:cs typeface="+mn-cs"/>
@@ -2823,17 +5050,22 @@
       </a:lvl7pPr>
       <a:lvl8pPr marL="3429000" indent="-228600" algn="l" defTabSz="914400" rtl="0" eaLnBrk="1" latinLnBrk="0" hangingPunct="1">
         <a:lnSpc>
-          <a:spcPct val="90000"/>
+          <a:spcPct val="120000"/>
         </a:lnSpc>
         <a:spcBef>
           <a:spcPts val="500"/>
         </a:spcBef>
+        <a:buClr>
+          <a:schemeClr val="accent1"/>
+        </a:buClr>
+        <a:buSzPct val="100000"/>
         <a:buFont typeface="Arial" panose="020B0604020202020204" pitchFamily="34" charset="0"/>
         <a:buChar char="•"/>
-        <a:defRPr sz="1800" kern="1200">
+        <a:defRPr sz="1200" kern="1200" baseline="0">
           <a:solidFill>
             <a:schemeClr val="tx1"/>
           </a:solidFill>
+          <a:effectLst/>
           <a:latin typeface="+mn-lt"/>
           <a:ea typeface="+mn-ea"/>
           <a:cs typeface="+mn-cs"/>
@@ -2841,17 +5073,22 @@
       </a:lvl8pPr>
       <a:lvl9pPr marL="3886200" indent="-228600" algn="l" defTabSz="914400" rtl="0" eaLnBrk="1" latinLnBrk="0" hangingPunct="1">
         <a:lnSpc>
-          <a:spcPct val="90000"/>
+          <a:spcPct val="120000"/>
         </a:lnSpc>
         <a:spcBef>
           <a:spcPts val="500"/>
         </a:spcBef>
+        <a:buClr>
+          <a:schemeClr val="accent1"/>
+        </a:buClr>
+        <a:buSzPct val="100000"/>
         <a:buFont typeface="Arial" panose="020B0604020202020204" pitchFamily="34" charset="0"/>
         <a:buChar char="•"/>
-        <a:defRPr sz="1800" kern="1200">
+        <a:defRPr sz="1200" kern="1200" baseline="0">
           <a:solidFill>
             <a:schemeClr val="tx1"/>
           </a:solidFill>
+          <a:effectLst/>
           <a:latin typeface="+mn-lt"/>
           <a:ea typeface="+mn-ea"/>
           <a:cs typeface="+mn-cs"/>
@@ -3073,7 +5310,13 @@
       </p:grpSpPr>
       <p:sp>
         <p:nvSpPr>
-          <p:cNvPr id="2" name="Title 1"/>
+          <p:cNvPr id="2" name="Title 1">
+            <a:extLst>
+              <a:ext uri="{FF2B5EF4-FFF2-40B4-BE49-F238E27FC236}">
+                <a16:creationId xmlns:a16="http://schemas.microsoft.com/office/drawing/2014/main" id="{1AD21E82-0B04-4358-9485-4378785BC79E}"/>
+              </a:ext>
+            </a:extLst>
+          </p:cNvPr>
           <p:cNvSpPr>
             <a:spLocks noGrp="1"/>
           </p:cNvSpPr>
@@ -3088,147 +5331,134 @@
           <a:p>
             <a:r>
               <a:rPr lang="en-AU" dirty="0"/>
-              <a:t>Use </a:t>
-            </a:r>
+              <a:t>Resources</a:t>
+            </a:r>
+          </a:p>
+        </p:txBody>
+      </p:sp>
+      <p:sp>
+        <p:nvSpPr>
+          <p:cNvPr id="3" name="Content Placeholder 2">
+            <a:extLst>
+              <a:ext uri="{FF2B5EF4-FFF2-40B4-BE49-F238E27FC236}">
+                <a16:creationId xmlns:a16="http://schemas.microsoft.com/office/drawing/2014/main" id="{1F0A5826-5E29-4529-ABA7-182DD0707566}"/>
+              </a:ext>
+            </a:extLst>
+          </p:cNvPr>
+          <p:cNvSpPr>
+            <a:spLocks noGrp="1"/>
+          </p:cNvSpPr>
+          <p:nvPr>
+            <p:ph idx="1"/>
+          </p:nvPr>
+        </p:nvSpPr>
+        <p:spPr/>
+        <p:txBody>
+          <a:bodyPr/>
+          <a:lstStyle/>
+          <a:p>
+            <a:r>
+              <a:rPr lang="en-AU" dirty="0"/>
+              <a:t>GitHub - </a:t>
+            </a:r>
+            <a:r>
+              <a:rPr lang="en-AU" dirty="0">
+                <a:hlinkClick r:id="rId2"/>
+              </a:rPr>
+              <a:t>https://github.com/gursharan001/LargeJsApps</a:t>
+            </a:r>
+            <a:endParaRPr lang="en-AU" dirty="0"/>
+          </a:p>
+          <a:p>
             <a:r>
               <a:rPr lang="en-AU" dirty="0" err="1"/>
-              <a:t>Javascript</a:t>
-            </a:r>
-            <a:r>
-              <a:rPr lang="en-AU" dirty="0"/>
-              <a:t> Code</a:t>
-            </a:r>
-          </a:p>
-        </p:txBody>
-      </p:sp>
-      <p:sp>
-        <p:nvSpPr>
-          <p:cNvPr id="3" name="Content Placeholder 2"/>
-          <p:cNvSpPr>
-            <a:spLocks noGrp="1"/>
-          </p:cNvSpPr>
-          <p:nvPr>
-            <p:ph idx="1"/>
-          </p:nvPr>
-        </p:nvSpPr>
-        <p:spPr/>
-        <p:txBody>
-          <a:bodyPr/>
-          <a:lstStyle/>
+              <a:t>CrossroadsJs</a:t>
+            </a:r>
+            <a:r>
+              <a:rPr lang="en-AU" dirty="0"/>
+              <a:t> - </a:t>
+            </a:r>
+            <a:r>
+              <a:rPr lang="en-AU" dirty="0">
+                <a:hlinkClick r:id="rId3"/>
+              </a:rPr>
+              <a:t>https://millermedeiros.github.io/crossroads.js/</a:t>
+            </a:r>
+            <a:endParaRPr lang="en-AU" dirty="0"/>
+          </a:p>
           <a:p>
             <a:r>
               <a:rPr lang="en-AU" dirty="0" err="1"/>
-              <a:t>Typings</a:t>
+              <a:t>HistoryJs</a:t>
+            </a:r>
+            <a:r>
+              <a:rPr lang="en-AU" dirty="0"/>
+              <a:t> - </a:t>
+            </a:r>
+            <a:r>
+              <a:rPr lang="en-AU" dirty="0">
+                <a:hlinkClick r:id="rId4"/>
+              </a:rPr>
+              <a:t>https://github.com/browserstate/history.js/</a:t>
             </a:r>
             <a:endParaRPr lang="en-AU" dirty="0"/>
           </a:p>
           <a:p>
             <a:r>
-              <a:rPr lang="en-AU" dirty="0"/>
-              <a:t>Functions with members</a:t>
-            </a:r>
-          </a:p>
-          <a:p>
-            <a:r>
-              <a:rPr lang="en-AU" dirty="0"/>
-              <a:t>Demo</a:t>
-            </a:r>
+              <a:rPr lang="en-AU" dirty="0" err="1"/>
+              <a:t>KnockoutJs</a:t>
+            </a:r>
+            <a:r>
+              <a:rPr lang="en-AU" dirty="0"/>
+              <a:t> - </a:t>
+            </a:r>
+            <a:r>
+              <a:rPr lang="en-AU" dirty="0">
+                <a:hlinkClick r:id="rId5"/>
+              </a:rPr>
+              <a:t>http://knockoutjs.com/</a:t>
+            </a:r>
+            <a:endParaRPr lang="en-AU" dirty="0"/>
+          </a:p>
+          <a:p>
+            <a:r>
+              <a:rPr lang="en-AU" dirty="0"/>
+              <a:t>Typescript - </a:t>
+            </a:r>
+            <a:r>
+              <a:rPr lang="en-AU" dirty="0">
+                <a:hlinkClick r:id="rId6"/>
+              </a:rPr>
+              <a:t>https://www.typescriptlang.org/</a:t>
+            </a:r>
+            <a:endParaRPr lang="en-AU" dirty="0"/>
+          </a:p>
+          <a:p>
+            <a:r>
+              <a:rPr lang="en-AU" dirty="0"/>
+              <a:t>html-to-</a:t>
+            </a:r>
+            <a:r>
+              <a:rPr lang="en-AU" dirty="0" err="1"/>
+              <a:t>json</a:t>
+            </a:r>
+            <a:r>
+              <a:rPr lang="en-AU" dirty="0"/>
+              <a:t> - https://www.npmjs.com/package/html-to-json</a:t>
+            </a:r>
+          </a:p>
+          <a:p>
+            <a:pPr marL="0" indent="0">
+              <a:buNone/>
+            </a:pPr>
+            <a:endParaRPr lang="en-AU" dirty="0"/>
           </a:p>
         </p:txBody>
       </p:sp>
     </p:spTree>
     <p:extLst>
       <p:ext uri="{BB962C8B-B14F-4D97-AF65-F5344CB8AC3E}">
-        <p14:creationId xmlns:p14="http://schemas.microsoft.com/office/powerpoint/2010/main" val="2484331286"/>
-      </p:ext>
-    </p:extLst>
-  </p:cSld>
-  <p:clrMapOvr>
-    <a:masterClrMapping/>
-  </p:clrMapOvr>
-</p:sld>
-</file>
-
-<file path=ppt/slides/slide11.xml><?xml version="1.0" encoding="utf-8"?>
-<p:sld xmlns:a="http://schemas.openxmlformats.org/drawingml/2006/main" xmlns:r="http://schemas.openxmlformats.org/officeDocument/2006/relationships" xmlns:p="http://schemas.openxmlformats.org/presentationml/2006/main">
-  <p:cSld>
-    <p:spTree>
-      <p:nvGrpSpPr>
-        <p:cNvPr id="1" name=""/>
-        <p:cNvGrpSpPr/>
-        <p:nvPr/>
-      </p:nvGrpSpPr>
-      <p:grpSpPr>
-        <a:xfrm>
-          <a:off x="0" y="0"/>
-          <a:ext cx="0" cy="0"/>
-          <a:chOff x="0" y="0"/>
-          <a:chExt cx="0" cy="0"/>
-        </a:xfrm>
-      </p:grpSpPr>
-      <p:sp>
-        <p:nvSpPr>
-          <p:cNvPr id="2" name="Title 1"/>
-          <p:cNvSpPr>
-            <a:spLocks noGrp="1"/>
-          </p:cNvSpPr>
-          <p:nvPr>
-            <p:ph type="title"/>
-          </p:nvPr>
-        </p:nvSpPr>
-        <p:spPr/>
-        <p:txBody>
-          <a:bodyPr/>
-          <a:lstStyle/>
-          <a:p>
-            <a:r>
-              <a:rPr lang="en-AU" dirty="0"/>
-              <a:t>Limitations</a:t>
-            </a:r>
-          </a:p>
-        </p:txBody>
-      </p:sp>
-      <p:sp>
-        <p:nvSpPr>
-          <p:cNvPr id="3" name="Content Placeholder 2"/>
-          <p:cNvSpPr>
-            <a:spLocks noGrp="1"/>
-          </p:cNvSpPr>
-          <p:nvPr>
-            <p:ph idx="1"/>
-          </p:nvPr>
-        </p:nvSpPr>
-        <p:spPr/>
-        <p:txBody>
-          <a:bodyPr/>
-          <a:lstStyle/>
-          <a:p>
-            <a:r>
-              <a:rPr lang="en-AU" dirty="0"/>
-              <a:t>Superior composition with Aurelia/React</a:t>
-            </a:r>
-          </a:p>
-          <a:p>
-            <a:r>
-              <a:rPr lang="en-AU" dirty="0"/>
-              <a:t>App initialization – Knockout components are asynchronous</a:t>
-            </a:r>
-          </a:p>
-          <a:p>
-            <a:r>
-              <a:rPr lang="en-AU" dirty="0"/>
-              <a:t>Limited by Knockout binding engine</a:t>
-            </a:r>
-          </a:p>
-          <a:p>
-            <a:endParaRPr lang="en-AU" dirty="0"/>
-          </a:p>
-        </p:txBody>
-      </p:sp>
-    </p:spTree>
-    <p:extLst>
-      <p:ext uri="{BB962C8B-B14F-4D97-AF65-F5344CB8AC3E}">
-        <p14:creationId xmlns:p14="http://schemas.microsoft.com/office/powerpoint/2010/main" val="890505248"/>
+        <p14:creationId xmlns:p14="http://schemas.microsoft.com/office/powerpoint/2010/main" val="2973103872"/>
       </p:ext>
     </p:extLst>
   </p:cSld>
@@ -3290,9 +5520,15 @@
         <p:spPr/>
         <p:txBody>
           <a:bodyPr>
-            <a:normAutofit lnSpcReduction="10000"/>
+            <a:normAutofit fontScale="85000" lnSpcReduction="20000"/>
           </a:bodyPr>
           <a:lstStyle/>
+          <a:p>
+            <a:r>
+              <a:rPr lang="en-AU" dirty="0"/>
+              <a:t>Typescript – Static Type checking</a:t>
+            </a:r>
+          </a:p>
           <a:p>
             <a:r>
               <a:rPr lang="en-AU" dirty="0"/>
@@ -3352,18 +5588,7 @@
           <a:p>
             <a:r>
               <a:rPr lang="en-AU" dirty="0"/>
-              <a:t>Child Router – </a:t>
-            </a:r>
-            <a:r>
-              <a:rPr lang="en-AU" dirty="0" err="1"/>
-              <a:t>CrossroadsJs</a:t>
-            </a:r>
-            <a:endParaRPr lang="en-AU" dirty="0"/>
-          </a:p>
-          <a:p>
-            <a:r>
-              <a:rPr lang="en-AU" dirty="0"/>
-              <a:t>Production Deployment</a:t>
+              <a:t>Production Deployment – Cache busting</a:t>
             </a:r>
           </a:p>
           <a:p>
@@ -3380,7 +5605,7 @@
           <a:p>
             <a:r>
               <a:rPr lang="en-AU" dirty="0"/>
-              <a:t>Use </a:t>
+              <a:t>Re-use </a:t>
             </a:r>
             <a:r>
               <a:rPr lang="en-AU" dirty="0" err="1"/>
@@ -3503,8 +5728,55 @@
           <a:p>
             <a:r>
               <a:rPr lang="en-AU" dirty="0"/>
-              <a:t>Speed of Delivery</a:t>
-            </a:r>
+              <a:t>Speed To Market</a:t>
+            </a:r>
+          </a:p>
+          <a:p>
+            <a:r>
+              <a:rPr lang="en-AU" dirty="0"/>
+              <a:t>Some Statistics so far</a:t>
+            </a:r>
+          </a:p>
+          <a:p>
+            <a:pPr lvl="1"/>
+            <a:r>
+              <a:rPr lang="en-AU" dirty="0"/>
+              <a:t>3 full-scale SPAs in production</a:t>
+            </a:r>
+          </a:p>
+          <a:p>
+            <a:pPr lvl="1"/>
+            <a:r>
+              <a:rPr lang="en-AU" dirty="0"/>
+              <a:t>Largest SPA - ~17000 lines of Typescript + Html + Tests</a:t>
+            </a:r>
+          </a:p>
+          <a:p>
+            <a:pPr lvl="1"/>
+            <a:r>
+              <a:rPr lang="en-AU" dirty="0"/>
+              <a:t>Previous largest vanilla </a:t>
+            </a:r>
+            <a:r>
+              <a:rPr lang="en-AU" dirty="0" err="1"/>
+              <a:t>javascript</a:t>
+            </a:r>
+            <a:r>
+              <a:rPr lang="en-AU" dirty="0"/>
+              <a:t> app - ~5400 lines of </a:t>
+            </a:r>
+            <a:r>
+              <a:rPr lang="en-AU" dirty="0" err="1"/>
+              <a:t>Javascript</a:t>
+            </a:r>
+            <a:r>
+              <a:rPr lang="en-AU" dirty="0"/>
+              <a:t> + Html</a:t>
+            </a:r>
+          </a:p>
+          <a:p>
+            <a:pPr lvl="1"/>
+            <a:endParaRPr lang="en-AU" dirty="0"/>
           </a:p>
           <a:p>
             <a:endParaRPr lang="en-AU" dirty="0"/>
@@ -3763,6 +6035,7 @@
             </a:r>
           </a:p>
           <a:p>
+            <a:pPr lvl="1"/>
             <a:r>
               <a:rPr lang="en-AU" dirty="0" err="1"/>
               <a:t>ViewModel</a:t>
@@ -3770,6 +6043,7 @@
             <a:endParaRPr lang="en-AU" dirty="0"/>
           </a:p>
           <a:p>
+            <a:pPr lvl="1"/>
             <a:r>
               <a:rPr lang="en-AU" dirty="0"/>
               <a:t>HTML</a:t>
@@ -3796,12 +6070,6 @@
             <a:r>
               <a:rPr lang="en-AU" dirty="0"/>
               <a:t>Component Composition</a:t>
-            </a:r>
-          </a:p>
-          <a:p>
-            <a:r>
-              <a:rPr lang="en-AU" dirty="0"/>
-              <a:t>Demo</a:t>
             </a:r>
           </a:p>
         </p:txBody>
@@ -3905,18 +6173,6 @@
               <a:t>Demo</a:t>
             </a:r>
           </a:p>
-          <a:p>
-            <a:r>
-              <a:rPr lang="en-AU" dirty="0"/>
-              <a:t>Child Router</a:t>
-            </a:r>
-          </a:p>
-          <a:p>
-            <a:r>
-              <a:rPr lang="en-AU" dirty="0"/>
-              <a:t>Demo</a:t>
-            </a:r>
-          </a:p>
         </p:txBody>
       </p:sp>
     </p:spTree>
@@ -3965,27 +6221,37 @@
           <a:lstStyle/>
           <a:p>
             <a:r>
+              <a:rPr lang="en-AU" dirty="0" err="1"/>
+              <a:t>Misc</a:t>
+            </a:r>
+            <a:endParaRPr lang="en-AU" dirty="0"/>
+          </a:p>
+        </p:txBody>
+      </p:sp>
+      <p:sp>
+        <p:nvSpPr>
+          <p:cNvPr id="3" name="Content Placeholder 2"/>
+          <p:cNvSpPr>
+            <a:spLocks noGrp="1"/>
+          </p:cNvSpPr>
+          <p:nvPr>
+            <p:ph idx="1"/>
+          </p:nvPr>
+        </p:nvSpPr>
+        <p:spPr/>
+        <p:txBody>
+          <a:bodyPr>
+            <a:normAutofit fontScale="92500" lnSpcReduction="10000"/>
+          </a:bodyPr>
+          <a:lstStyle/>
+          <a:p>
+            <a:r>
               <a:rPr lang="en-AU" dirty="0"/>
               <a:t>Production Deployment</a:t>
             </a:r>
           </a:p>
-        </p:txBody>
-      </p:sp>
-      <p:sp>
-        <p:nvSpPr>
-          <p:cNvPr id="3" name="Content Placeholder 2"/>
-          <p:cNvSpPr>
-            <a:spLocks noGrp="1"/>
-          </p:cNvSpPr>
-          <p:nvPr>
-            <p:ph idx="1"/>
-          </p:nvPr>
-        </p:nvSpPr>
-        <p:spPr/>
-        <p:txBody>
-          <a:bodyPr/>
-          <a:lstStyle/>
-          <a:p>
+          <a:p>
+            <a:pPr lvl="1"/>
             <a:r>
               <a:rPr lang="en-AU" dirty="0" err="1"/>
               <a:t>Cachebuster</a:t>
@@ -3993,10 +6259,67 @@
             <a:endParaRPr lang="en-AU" dirty="0"/>
           </a:p>
           <a:p>
+            <a:pPr lvl="1"/>
             <a:r>
               <a:rPr lang="en-AU" dirty="0"/>
               <a:t>Demo</a:t>
             </a:r>
+          </a:p>
+          <a:p>
+            <a:r>
+              <a:rPr lang="en-AU" dirty="0"/>
+              <a:t>Debugging</a:t>
+            </a:r>
+          </a:p>
+          <a:p>
+            <a:pPr lvl="1"/>
+            <a:r>
+              <a:rPr lang="en-AU" dirty="0" err="1"/>
+              <a:t>Sourcemaps</a:t>
+            </a:r>
+            <a:endParaRPr lang="en-AU" dirty="0"/>
+          </a:p>
+          <a:p>
+            <a:pPr lvl="1"/>
+            <a:r>
+              <a:rPr lang="en-AU" dirty="0"/>
+              <a:t>Demo</a:t>
+            </a:r>
+          </a:p>
+          <a:p>
+            <a:r>
+              <a:rPr lang="en-AU" dirty="0"/>
+              <a:t>Use </a:t>
+            </a:r>
+            <a:r>
+              <a:rPr lang="en-AU" dirty="0" err="1"/>
+              <a:t>Javascript</a:t>
+            </a:r>
+            <a:r>
+              <a:rPr lang="en-AU" dirty="0"/>
+              <a:t> Code</a:t>
+            </a:r>
+          </a:p>
+          <a:p>
+            <a:pPr lvl="1"/>
+            <a:r>
+              <a:rPr lang="en-AU" dirty="0" err="1"/>
+              <a:t>Typings</a:t>
+            </a:r>
+            <a:endParaRPr lang="en-AU" dirty="0"/>
+          </a:p>
+          <a:p>
+            <a:pPr lvl="1"/>
+            <a:r>
+              <a:rPr lang="en-AU" dirty="0"/>
+              <a:t>Demo</a:t>
+            </a:r>
+          </a:p>
+          <a:p>
+            <a:endParaRPr lang="en-AU" dirty="0"/>
+          </a:p>
+          <a:p>
+            <a:endParaRPr lang="en-AU" dirty="0"/>
           </a:p>
         </p:txBody>
       </p:sp>
@@ -4047,7 +6370,7 @@
           <a:p>
             <a:r>
               <a:rPr lang="en-AU" dirty="0"/>
-              <a:t>Debugging</a:t>
+              <a:t>Limitations</a:t>
             </a:r>
           </a:p>
         </p:txBody>
@@ -4068,23 +6391,31 @@
           <a:lstStyle/>
           <a:p>
             <a:r>
-              <a:rPr lang="en-AU" dirty="0" err="1"/>
-              <a:t>Sourcemaps</a:t>
-            </a:r>
+              <a:rPr lang="en-AU" dirty="0"/>
+              <a:t>Superior composition with Aurelia/React</a:t>
+            </a:r>
+          </a:p>
+          <a:p>
+            <a:r>
+              <a:rPr lang="en-AU" dirty="0"/>
+              <a:t>App initialization – Knockout components are asynchronous</a:t>
+            </a:r>
+          </a:p>
+          <a:p>
+            <a:r>
+              <a:rPr lang="en-AU" dirty="0"/>
+              <a:t>Limited by Knockout binding engine</a:t>
+            </a:r>
+          </a:p>
+          <a:p>
             <a:endParaRPr lang="en-AU" dirty="0"/>
-          </a:p>
-          <a:p>
-            <a:r>
-              <a:rPr lang="en-AU" dirty="0"/>
-              <a:t>Demo</a:t>
-            </a:r>
           </a:p>
         </p:txBody>
       </p:sp>
     </p:spTree>
     <p:extLst>
       <p:ext uri="{BB962C8B-B14F-4D97-AF65-F5344CB8AC3E}">
-        <p14:creationId xmlns:p14="http://schemas.microsoft.com/office/powerpoint/2010/main" val="2755391641"/>
+        <p14:creationId xmlns:p14="http://schemas.microsoft.com/office/powerpoint/2010/main" val="890505248"/>
       </p:ext>
     </p:extLst>
   </p:cSld>
@@ -4095,6 +6426,259 @@
 </file>
 
 <file path=ppt/theme/theme1.xml><?xml version="1.0" encoding="utf-8"?>
+<a:theme xmlns:a="http://schemas.openxmlformats.org/drawingml/2006/main" name="Gallery">
+  <a:themeElements>
+    <a:clrScheme name="Red">
+      <a:dk1>
+        <a:sysClr val="windowText" lastClr="000000"/>
+      </a:dk1>
+      <a:lt1>
+        <a:sysClr val="window" lastClr="FFFFFF"/>
+      </a:lt1>
+      <a:dk2>
+        <a:srgbClr val="323232"/>
+      </a:dk2>
+      <a:lt2>
+        <a:srgbClr val="E5C243"/>
+      </a:lt2>
+      <a:accent1>
+        <a:srgbClr val="A5300F"/>
+      </a:accent1>
+      <a:accent2>
+        <a:srgbClr val="D55816"/>
+      </a:accent2>
+      <a:accent3>
+        <a:srgbClr val="E19825"/>
+      </a:accent3>
+      <a:accent4>
+        <a:srgbClr val="B19C7D"/>
+      </a:accent4>
+      <a:accent5>
+        <a:srgbClr val="7F5F52"/>
+      </a:accent5>
+      <a:accent6>
+        <a:srgbClr val="B27D49"/>
+      </a:accent6>
+      <a:hlink>
+        <a:srgbClr val="6B9F25"/>
+      </a:hlink>
+      <a:folHlink>
+        <a:srgbClr val="B26B02"/>
+      </a:folHlink>
+    </a:clrScheme>
+    <a:fontScheme name="Gallery">
+      <a:majorFont>
+        <a:latin typeface="Gill Sans MT" panose="020B0502020104020203"/>
+        <a:ea typeface=""/>
+        <a:cs typeface=""/>
+        <a:font script="Jpan" typeface="游ゴシック Light"/>
+        <a:font script="Hang" typeface="맑은 고딕"/>
+        <a:font script="Hans" typeface="等线 Light"/>
+        <a:font script="Hant" typeface="新細明體"/>
+        <a:font script="Arab" typeface="Times New Roman"/>
+        <a:font script="Hebr" typeface="Times New Roman"/>
+        <a:font script="Thai" typeface="Angsana New"/>
+        <a:font script="Ethi" typeface="Nyala"/>
+        <a:font script="Beng" typeface="Vrinda"/>
+        <a:font script="Gujr" typeface="Shruti"/>
+        <a:font script="Khmr" typeface="MoolBoran"/>
+        <a:font script="Knda" typeface="Tunga"/>
+        <a:font script="Guru" typeface="Raavi"/>
+        <a:font script="Cans" typeface="Euphemia"/>
+        <a:font script="Cher" typeface="Plantagenet Cherokee"/>
+        <a:font script="Yiii" typeface="Microsoft Yi Baiti"/>
+        <a:font script="Tibt" typeface="Microsoft Himalaya"/>
+        <a:font script="Thaa" typeface="MV Boli"/>
+        <a:font script="Deva" typeface="Mangal"/>
+        <a:font script="Telu" typeface="Gautami"/>
+        <a:font script="Taml" typeface="Latha"/>
+        <a:font script="Syrc" typeface="Estrangelo Edessa"/>
+        <a:font script="Orya" typeface="Kalinga"/>
+        <a:font script="Mlym" typeface="Kartika"/>
+        <a:font script="Laoo" typeface="DokChampa"/>
+        <a:font script="Sinh" typeface="Iskoola Pota"/>
+        <a:font script="Mong" typeface="Mongolian Baiti"/>
+        <a:font script="Viet" typeface="Times New Roman"/>
+        <a:font script="Uigh" typeface="Microsoft Uighur"/>
+        <a:font script="Geor" typeface="Sylfaen"/>
+      </a:majorFont>
+      <a:minorFont>
+        <a:latin typeface="Gill Sans MT" panose="020B0502020104020203"/>
+        <a:ea typeface=""/>
+        <a:cs typeface=""/>
+        <a:font script="Jpan" typeface="游ゴシック"/>
+        <a:font script="Hang" typeface="맑은 고딕"/>
+        <a:font script="Hans" typeface="等线"/>
+        <a:font script="Hant" typeface="新細明體"/>
+        <a:font script="Arab" typeface="Arial"/>
+        <a:font script="Hebr" typeface="Arial"/>
+        <a:font script="Thai" typeface="Cordia New"/>
+        <a:font script="Ethi" typeface="Nyala"/>
+        <a:font script="Beng" typeface="Vrinda"/>
+        <a:font script="Gujr" typeface="Shruti"/>
+        <a:font script="Khmr" typeface="DaunPenh"/>
+        <a:font script="Knda" typeface="Tunga"/>
+        <a:font script="Guru" typeface="Raavi"/>
+        <a:font script="Cans" typeface="Euphemia"/>
+        <a:font script="Cher" typeface="Plantagenet Cherokee"/>
+        <a:font script="Yiii" typeface="Microsoft Yi Baiti"/>
+        <a:font script="Tibt" typeface="Microsoft Himalaya"/>
+        <a:font script="Thaa" typeface="MV Boli"/>
+        <a:font script="Deva" typeface="Mangal"/>
+        <a:font script="Telu" typeface="Gautami"/>
+        <a:font script="Taml" typeface="Latha"/>
+        <a:font script="Syrc" typeface="Estrangelo Edessa"/>
+        <a:font script="Orya" typeface="Kalinga"/>
+        <a:font script="Mlym" typeface="Kartika"/>
+        <a:font script="Laoo" typeface="DokChampa"/>
+        <a:font script="Sinh" typeface="Iskoola Pota"/>
+        <a:font script="Mong" typeface="Mongolian Baiti"/>
+        <a:font script="Viet" typeface="Arial"/>
+        <a:font script="Uigh" typeface="Microsoft Uighur"/>
+        <a:font script="Geor" typeface="Sylfaen"/>
+      </a:minorFont>
+    </a:fontScheme>
+    <a:fmtScheme name="Gallery">
+      <a:fillStyleLst>
+        <a:solidFill>
+          <a:schemeClr val="phClr"/>
+        </a:solidFill>
+        <a:gradFill rotWithShape="1">
+          <a:gsLst>
+            <a:gs pos="0">
+              <a:schemeClr val="phClr">
+                <a:tint val="54000"/>
+                <a:alpha val="100000"/>
+                <a:satMod val="105000"/>
+                <a:lumMod val="110000"/>
+              </a:schemeClr>
+            </a:gs>
+            <a:gs pos="100000">
+              <a:schemeClr val="phClr">
+                <a:tint val="78000"/>
+                <a:alpha val="92000"/>
+                <a:satMod val="109000"/>
+                <a:lumMod val="100000"/>
+              </a:schemeClr>
+            </a:gs>
+          </a:gsLst>
+          <a:lin ang="5400000" scaled="0"/>
+        </a:gradFill>
+        <a:gradFill rotWithShape="1">
+          <a:gsLst>
+            <a:gs pos="0">
+              <a:schemeClr val="phClr">
+                <a:tint val="98000"/>
+                <a:satMod val="110000"/>
+                <a:lumMod val="104000"/>
+              </a:schemeClr>
+            </a:gs>
+            <a:gs pos="69000">
+              <a:schemeClr val="phClr">
+                <a:shade val="88000"/>
+                <a:satMod val="130000"/>
+                <a:lumMod val="92000"/>
+              </a:schemeClr>
+            </a:gs>
+            <a:gs pos="100000">
+              <a:schemeClr val="phClr">
+                <a:shade val="78000"/>
+                <a:satMod val="130000"/>
+                <a:lumMod val="92000"/>
+              </a:schemeClr>
+            </a:gs>
+          </a:gsLst>
+          <a:lin ang="5400000" scaled="0"/>
+        </a:gradFill>
+      </a:fillStyleLst>
+      <a:lnStyleLst>
+        <a:ln w="9525" cap="flat" cmpd="sng" algn="ctr">
+          <a:solidFill>
+            <a:schemeClr val="phClr"/>
+          </a:solidFill>
+          <a:prstDash val="solid"/>
+        </a:ln>
+        <a:ln w="15875" cap="flat" cmpd="sng" algn="ctr">
+          <a:solidFill>
+            <a:schemeClr val="phClr"/>
+          </a:solidFill>
+          <a:prstDash val="solid"/>
+        </a:ln>
+        <a:ln w="22225" cap="flat" cmpd="sng" algn="ctr">
+          <a:solidFill>
+            <a:schemeClr val="phClr"/>
+          </a:solidFill>
+          <a:prstDash val="solid"/>
+        </a:ln>
+      </a:lnStyleLst>
+      <a:effectStyleLst>
+        <a:effectStyle>
+          <a:effectLst/>
+        </a:effectStyle>
+        <a:effectStyle>
+          <a:effectLst/>
+        </a:effectStyle>
+        <a:effectStyle>
+          <a:effectLst>
+            <a:outerShdw blurRad="50800" dist="50800" dir="5400000" sx="96000" sy="96000" rotWithShape="0">
+              <a:srgbClr val="000000">
+                <a:alpha val="48000"/>
+              </a:srgbClr>
+            </a:outerShdw>
+          </a:effectLst>
+          <a:scene3d>
+            <a:camera prst="orthographicFront">
+              <a:rot lat="0" lon="0" rev="0"/>
+            </a:camera>
+            <a:lightRig rig="balanced" dir="t">
+              <a:rot lat="0" lon="0" rev="1080000"/>
+            </a:lightRig>
+          </a:scene3d>
+          <a:sp3d>
+            <a:bevelT w="38100" h="12700" prst="softRound"/>
+          </a:sp3d>
+        </a:effectStyle>
+      </a:effectStyleLst>
+      <a:bgFillStyleLst>
+        <a:solidFill>
+          <a:schemeClr val="phClr"/>
+        </a:solidFill>
+        <a:solidFill>
+          <a:schemeClr val="phClr"/>
+        </a:solidFill>
+        <a:gradFill rotWithShape="1">
+          <a:gsLst>
+            <a:gs pos="0">
+              <a:schemeClr val="phClr">
+                <a:tint val="94000"/>
+                <a:satMod val="80000"/>
+                <a:lumMod val="106000"/>
+              </a:schemeClr>
+            </a:gs>
+            <a:gs pos="100000">
+              <a:schemeClr val="phClr">
+                <a:shade val="80000"/>
+              </a:schemeClr>
+            </a:gs>
+          </a:gsLst>
+          <a:path path="circle">
+            <a:fillToRect l="43000" r="43000" b="100000"/>
+          </a:path>
+        </a:gradFill>
+      </a:bgFillStyleLst>
+    </a:fmtScheme>
+  </a:themeElements>
+  <a:objectDefaults/>
+  <a:extraClrSchemeLst/>
+  <a:extLst>
+    <a:ext uri="{05A4C25C-085E-4340-85A3-A5531E510DB2}">
+      <thm15:themeFamily xmlns:thm15="http://schemas.microsoft.com/office/thememl/2012/main" name="Gallery" id="{BBFCD31E-59A1-489D-B089-A3EAD7CAE12E}" vid="{F5E91637-A7B6-4E27-B710-77DA7014EE1E}"/>
+    </a:ext>
+  </a:extLst>
+</a:theme>
+</file>
+
+<file path=ppt/theme/theme2.xml><?xml version="1.0" encoding="utf-8"?>
 <a:theme xmlns:a="http://schemas.openxmlformats.org/drawingml/2006/main" name="Office Theme">
   <a:themeElements>
     <a:clrScheme name="Office">

</xml_diff>